<commit_message>
New instructions and balanced lfet/right hand responses
</commit_message>
<xml_diff>
--- a/instructions/Instructions.pptx
+++ b/instructions/Instructions.pptx
@@ -6,12 +6,14 @@
   </p:sldMasterIdLst>
   <p:sldIdLst>
     <p:sldId id="256" r:id="rId2"/>
-    <p:sldId id="257" r:id="rId3"/>
-    <p:sldId id="259" r:id="rId4"/>
-    <p:sldId id="262" r:id="rId5"/>
-    <p:sldId id="260" r:id="rId6"/>
-    <p:sldId id="261" r:id="rId7"/>
-    <p:sldId id="258" r:id="rId8"/>
+    <p:sldId id="264" r:id="rId3"/>
+    <p:sldId id="265" r:id="rId4"/>
+    <p:sldId id="259" r:id="rId5"/>
+    <p:sldId id="266" r:id="rId6"/>
+    <p:sldId id="262" r:id="rId7"/>
+    <p:sldId id="260" r:id="rId8"/>
+    <p:sldId id="261" r:id="rId9"/>
+    <p:sldId id="258" r:id="rId10"/>
   </p:sldIdLst>
   <p:sldSz cx="12192000" cy="6858000"/>
   <p:notesSz cx="6858000" cy="9144000"/>
@@ -308,7 +310,7 @@
           <a:p>
             <a:fld id="{9D7C6ACB-8DF6-1449-BE97-CA8D947F79D3}" type="datetimeFigureOut">
               <a:rPr lang="en-US" smtClean="0"/>
-              <a:t>3/17/2023</a:t>
+              <a:t>3/30/2023</a:t>
             </a:fld>
             <a:endParaRPr lang="en-US"/>
           </a:p>
@@ -476,7 +478,7 @@
           <a:p>
             <a:fld id="{9D7C6ACB-8DF6-1449-BE97-CA8D947F79D3}" type="datetimeFigureOut">
               <a:rPr lang="en-US" smtClean="0"/>
-              <a:t>3/17/2023</a:t>
+              <a:t>3/30/2023</a:t>
             </a:fld>
             <a:endParaRPr lang="en-US"/>
           </a:p>
@@ -654,7 +656,7 @@
           <a:p>
             <a:fld id="{9D7C6ACB-8DF6-1449-BE97-CA8D947F79D3}" type="datetimeFigureOut">
               <a:rPr lang="en-US" smtClean="0"/>
-              <a:t>3/17/2023</a:t>
+              <a:t>3/30/2023</a:t>
             </a:fld>
             <a:endParaRPr lang="en-US"/>
           </a:p>
@@ -822,7 +824,7 @@
           <a:p>
             <a:fld id="{9D7C6ACB-8DF6-1449-BE97-CA8D947F79D3}" type="datetimeFigureOut">
               <a:rPr lang="en-US" smtClean="0"/>
-              <a:t>3/17/2023</a:t>
+              <a:t>3/30/2023</a:t>
             </a:fld>
             <a:endParaRPr lang="en-US"/>
           </a:p>
@@ -1067,7 +1069,7 @@
           <a:p>
             <a:fld id="{9D7C6ACB-8DF6-1449-BE97-CA8D947F79D3}" type="datetimeFigureOut">
               <a:rPr lang="en-US" smtClean="0"/>
-              <a:t>3/17/2023</a:t>
+              <a:t>3/30/2023</a:t>
             </a:fld>
             <a:endParaRPr lang="en-US"/>
           </a:p>
@@ -1352,7 +1354,7 @@
           <a:p>
             <a:fld id="{9D7C6ACB-8DF6-1449-BE97-CA8D947F79D3}" type="datetimeFigureOut">
               <a:rPr lang="en-US" smtClean="0"/>
-              <a:t>3/17/2023</a:t>
+              <a:t>3/30/2023</a:t>
             </a:fld>
             <a:endParaRPr lang="en-US"/>
           </a:p>
@@ -1771,7 +1773,7 @@
           <a:p>
             <a:fld id="{9D7C6ACB-8DF6-1449-BE97-CA8D947F79D3}" type="datetimeFigureOut">
               <a:rPr lang="en-US" smtClean="0"/>
-              <a:t>3/17/2023</a:t>
+              <a:t>3/30/2023</a:t>
             </a:fld>
             <a:endParaRPr lang="en-US"/>
           </a:p>
@@ -1888,7 +1890,7 @@
           <a:p>
             <a:fld id="{9D7C6ACB-8DF6-1449-BE97-CA8D947F79D3}" type="datetimeFigureOut">
               <a:rPr lang="en-US" smtClean="0"/>
-              <a:t>3/17/2023</a:t>
+              <a:t>3/30/2023</a:t>
             </a:fld>
             <a:endParaRPr lang="en-US"/>
           </a:p>
@@ -1983,7 +1985,7 @@
           <a:p>
             <a:fld id="{9D7C6ACB-8DF6-1449-BE97-CA8D947F79D3}" type="datetimeFigureOut">
               <a:rPr lang="en-US" smtClean="0"/>
-              <a:t>3/17/2023</a:t>
+              <a:t>3/30/2023</a:t>
             </a:fld>
             <a:endParaRPr lang="en-US"/>
           </a:p>
@@ -2258,7 +2260,7 @@
           <a:p>
             <a:fld id="{9D7C6ACB-8DF6-1449-BE97-CA8D947F79D3}" type="datetimeFigureOut">
               <a:rPr lang="en-US" smtClean="0"/>
-              <a:t>3/17/2023</a:t>
+              <a:t>3/30/2023</a:t>
             </a:fld>
             <a:endParaRPr lang="en-US"/>
           </a:p>
@@ -2510,7 +2512,7 @@
           <a:p>
             <a:fld id="{9D7C6ACB-8DF6-1449-BE97-CA8D947F79D3}" type="datetimeFigureOut">
               <a:rPr lang="en-US" smtClean="0"/>
-              <a:t>3/17/2023</a:t>
+              <a:t>3/30/2023</a:t>
             </a:fld>
             <a:endParaRPr lang="en-US"/>
           </a:p>
@@ -2724,7 +2726,7 @@
           <a:p>
             <a:fld id="{9D7C6ACB-8DF6-1449-BE97-CA8D947F79D3}" type="datetimeFigureOut">
               <a:rPr lang="en-US" smtClean="0"/>
-              <a:t>3/17/2023</a:t>
+              <a:t>3/30/2023</a:t>
             </a:fld>
             <a:endParaRPr lang="en-US"/>
           </a:p>
@@ -3108,7 +3110,7 @@
         <p:spPr>
           <a:xfrm>
             <a:off x="2178287" y="575342"/>
-            <a:ext cx="7774486" cy="6740307"/>
+            <a:ext cx="7774486" cy="5847755"/>
           </a:xfrm>
           <a:prstGeom prst="rect">
             <a:avLst/>
@@ -3122,70 +3124,79 @@
           <a:lstStyle/>
           <a:p>
             <a:r>
-              <a:rPr lang="en-US" sz="2400" dirty="0"/>
+              <a:rPr lang="en-US" sz="2200" dirty="0"/>
               <a:t>Welcome to the experiment!</a:t>
             </a:r>
           </a:p>
           <a:p>
-            <a:endParaRPr lang="en-US" sz="2400" dirty="0"/>
-          </a:p>
-          <a:p>
-            <a:r>
-              <a:rPr lang="en-US" sz="2400" dirty="0"/>
+            <a:endParaRPr lang="en-US" sz="2200" dirty="0"/>
+          </a:p>
+          <a:p>
+            <a:r>
+              <a:rPr lang="en-US" sz="2200" dirty="0"/>
               <a:t>In this study we will present you with sequences of images. Each image will be a particular face, object, letter or meaningless symbol, like these:</a:t>
             </a:r>
           </a:p>
           <a:p>
-            <a:endParaRPr lang="en-US" sz="2400" dirty="0"/>
-          </a:p>
-          <a:p>
-            <a:endParaRPr lang="en-US" sz="2400" dirty="0"/>
-          </a:p>
-          <a:p>
-            <a:endParaRPr lang="en-US" sz="2400" dirty="0"/>
-          </a:p>
-          <a:p>
-            <a:endParaRPr lang="en-US" sz="2400" dirty="0"/>
-          </a:p>
-          <a:p>
-            <a:endParaRPr lang="en-US" sz="2400" dirty="0"/>
-          </a:p>
-          <a:p>
-            <a:endParaRPr lang="en-US" sz="2400" dirty="0"/>
-          </a:p>
-          <a:p>
-            <a:r>
-              <a:rPr lang="en-US" sz="2400" dirty="0"/>
-              <a:t>Some will be presented in front view and some in side view; some will be shown briefly and some for longer periods of time.</a:t>
-            </a:r>
+            <a:endParaRPr lang="en-US" sz="2200" dirty="0"/>
+          </a:p>
+          <a:p>
+            <a:endParaRPr lang="en-US" sz="2200" dirty="0"/>
+          </a:p>
+          <a:p>
+            <a:endParaRPr lang="en-US" sz="2200" dirty="0"/>
+          </a:p>
+          <a:p>
+            <a:endParaRPr lang="en-US" sz="2200" dirty="0"/>
+          </a:p>
+          <a:p>
+            <a:endParaRPr lang="en-US" sz="2200" dirty="0"/>
+          </a:p>
+          <a:p>
+            <a:endParaRPr lang="en-US" sz="2200" dirty="0"/>
+          </a:p>
+          <a:p>
+            <a:r>
+              <a:rPr lang="en-US" sz="2200" dirty="0"/>
+              <a:t>Some will be presented in front view and some in side </a:t>
+            </a:r>
+            <a:r>
+              <a:rPr lang="en-US" sz="2200" dirty="0" smtClean="0"/>
+              <a:t>view.</a:t>
+            </a:r>
+            <a:endParaRPr lang="en-US" sz="2200" dirty="0"/>
           </a:p>
           <a:p>
             <a:pPr algn="ctr"/>
-            <a:endParaRPr lang="en-US" sz="2400" dirty="0"/>
+            <a:endParaRPr lang="en-US" sz="2200" dirty="0" smtClean="0"/>
           </a:p>
           <a:p>
             <a:pPr algn="ctr"/>
-            <a:r>
-              <a:rPr lang="en-US" sz="2400" dirty="0"/>
+            <a:endParaRPr lang="en-US" sz="2200" dirty="0"/>
+          </a:p>
+          <a:p>
+            <a:pPr algn="ctr"/>
+            <a:r>
+              <a:rPr lang="en-US" sz="2200" dirty="0"/>
               <a:t>Press the </a:t>
             </a:r>
             <a:r>
-              <a:rPr lang="en-US" sz="2400" b="1" dirty="0"/>
+              <a:rPr lang="en-US" sz="2200" b="1" dirty="0"/>
               <a:t>right arrow key</a:t>
             </a:r>
             <a:r>
-              <a:rPr lang="en-US" sz="2400" dirty="0"/>
+              <a:rPr lang="en-US" sz="2200" dirty="0"/>
               <a:t> to proceed</a:t>
             </a:r>
           </a:p>
           <a:p>
             <a:r>
-              <a:rPr lang="en-US" sz="2400" dirty="0"/>
+              <a:rPr lang="en-US" sz="2200" dirty="0"/>
               <a:t> </a:t>
             </a:r>
           </a:p>
           <a:p>
-            <a:endParaRPr lang="en-US" sz="2400" dirty="0"/>
+            <a:endParaRPr lang="en-US" sz="2200" dirty="0"/>
           </a:p>
         </p:txBody>
       </p:sp>
@@ -3355,38 +3366,78 @@
           <a:p>
             <a:r>
               <a:rPr lang="en-US" sz="2400" dirty="0"/>
-              <a:t>Your main task will be to attentively look at each image for as long as it’s on the screen, and </a:t>
+              <a:t>Your main task will be to attentively look at each image for as long as it’s on the screen, </a:t>
+            </a:r>
+            <a:r>
+              <a:rPr lang="en-US" sz="2400" dirty="0" smtClean="0"/>
+              <a:t>and </a:t>
+            </a:r>
+            <a:r>
+              <a:rPr lang="en-US" sz="2400" b="1" dirty="0" smtClean="0"/>
+              <a:t>press the</a:t>
             </a:r>
             <a:r>
               <a:rPr lang="en-US" sz="2400" b="1" dirty="0"/>
-              <a:t>press a button whenever you see a target image</a:t>
-            </a:r>
-            <a:r>
-              <a:rPr lang="en-US" sz="2400" dirty="0"/>
-              <a:t>.</a:t>
-            </a:r>
-          </a:p>
-          <a:p>
+              <a:t> </a:t>
+            </a:r>
+            <a:r>
+              <a:rPr lang="en-US" sz="2400" b="1" dirty="0" smtClean="0"/>
+              <a:t>green </a:t>
+            </a:r>
+            <a:r>
+              <a:rPr lang="en-US" sz="2400" b="1" dirty="0"/>
+              <a:t>button </a:t>
+            </a:r>
+            <a:r>
+              <a:rPr lang="en-US" sz="2400" dirty="0"/>
+              <a:t>whenever </a:t>
+            </a:r>
+            <a:r>
+              <a:rPr lang="en-US" sz="2400" dirty="0"/>
+              <a:t>you see a </a:t>
+            </a:r>
+            <a:r>
+              <a:rPr lang="en-US" sz="2400" b="1" dirty="0"/>
+              <a:t>target </a:t>
+            </a:r>
+            <a:r>
+              <a:rPr lang="en-US" sz="2400" b="1" dirty="0" smtClean="0"/>
+              <a:t>image </a:t>
+            </a:r>
+            <a:r>
+              <a:rPr lang="en-US" sz="2400" dirty="0" smtClean="0"/>
+              <a:t>in </a:t>
+            </a:r>
+            <a:r>
+              <a:rPr lang="en-US" sz="2400" dirty="0"/>
+              <a:t>any view (front or side).</a:t>
+            </a:r>
+          </a:p>
+          <a:p>
+            <a:r>
+              <a:rPr lang="en-US" sz="2400" dirty="0" smtClean="0"/>
+              <a:t>Please respond</a:t>
+            </a:r>
+            <a:r>
+              <a:rPr lang="en-US" sz="2400" dirty="0"/>
+              <a:t> as quickly and as accurately as </a:t>
+            </a:r>
+            <a:r>
+              <a:rPr lang="en-US" sz="2400" dirty="0" smtClean="0"/>
+              <a:t>possible.</a:t>
+            </a:r>
             <a:endParaRPr lang="en-US" sz="2400" dirty="0"/>
           </a:p>
           <a:p>
-            <a:r>
-              <a:rPr lang="en-US" sz="2400" dirty="0"/>
-              <a:t>Please press the </a:t>
-            </a:r>
-            <a:r>
-              <a:rPr lang="en-US" sz="2400" b="1" dirty="0"/>
-              <a:t>space bar,</a:t>
-            </a:r>
-            <a:r>
-              <a:rPr lang="en-US" sz="2400" dirty="0"/>
-              <a:t> as quickly and as accurately as possible, whenever you see a target image in any view (front or side) for any amount of time (short or long duration).</a:t>
-            </a:r>
-          </a:p>
-          <a:p>
             <a:endParaRPr lang="en-US" sz="2400" dirty="0"/>
           </a:p>
           <a:p>
+            <a:endParaRPr lang="en-US" sz="2400" dirty="0" smtClean="0"/>
+          </a:p>
+          <a:p>
+            <a:endParaRPr lang="en-US" sz="2400" dirty="0" smtClean="0"/>
+          </a:p>
+          <a:p>
             <a:endParaRPr lang="en-US" sz="2400" dirty="0"/>
           </a:p>
           <a:p>
@@ -3394,9 +3445,17 @@
           </a:p>
           <a:p>
             <a:pPr algn="ctr"/>
-            <a:r>
-              <a:rPr lang="en-US" sz="2400" dirty="0"/>
-              <a:t>Press the </a:t>
+            <a:endParaRPr lang="en-US" sz="2400" dirty="0" smtClean="0"/>
+          </a:p>
+          <a:p>
+            <a:pPr algn="ctr"/>
+            <a:r>
+              <a:rPr lang="en-US" sz="2400" dirty="0" smtClean="0"/>
+              <a:t>Press </a:t>
+            </a:r>
+            <a:r>
+              <a:rPr lang="en-US" sz="2400" dirty="0"/>
+              <a:t>the </a:t>
             </a:r>
             <a:r>
               <a:rPr lang="en-US" sz="2400" b="1" dirty="0"/>
@@ -3439,10 +3498,428 @@
           </a:p>
         </p:txBody>
       </p:sp>
+      <p:grpSp>
+        <p:nvGrpSpPr>
+          <p:cNvPr id="13" name="Gruppieren 12"/>
+          <p:cNvGrpSpPr/>
+          <p:nvPr/>
+        </p:nvGrpSpPr>
+        <p:grpSpPr>
+          <a:xfrm>
+            <a:off x="5121520" y="3837626"/>
+            <a:ext cx="1888019" cy="1599765"/>
+            <a:chOff x="1866122" y="1498567"/>
+            <a:chExt cx="5075854" cy="3250713"/>
+          </a:xfrm>
+        </p:grpSpPr>
+        <p:pic>
+          <p:nvPicPr>
+            <p:cNvPr id="5" name="Grafik 4"/>
+            <p:cNvPicPr/>
+            <p:nvPr/>
+          </p:nvPicPr>
+          <p:blipFill rotWithShape="1">
+            <a:blip r:embed="rId2" cstate="hqprint">
+              <a:extLst>
+                <a:ext uri="{28A0092B-C50C-407E-A947-70E740481C1C}">
+                  <a14:useLocalDpi xmlns:a14="http://schemas.microsoft.com/office/drawing/2010/main" val="0"/>
+                </a:ext>
+              </a:extLst>
+            </a:blip>
+            <a:srcRect/>
+            <a:stretch/>
+          </p:blipFill>
+          <p:spPr bwMode="auto">
+            <a:xfrm>
+              <a:off x="1866122" y="1498567"/>
+              <a:ext cx="5075854" cy="3250713"/>
+            </a:xfrm>
+            <a:prstGeom prst="rect">
+              <a:avLst/>
+            </a:prstGeom>
+            <a:ln>
+              <a:noFill/>
+            </a:ln>
+            <a:extLst>
+              <a:ext uri="{53640926-AAD7-44D8-BBD7-CCE9431645EC}">
+                <a14:shadowObscured xmlns:a14="http://schemas.microsoft.com/office/drawing/2010/main"/>
+              </a:ext>
+            </a:extLst>
+          </p:spPr>
+        </p:pic>
+        <p:sp>
+          <p:nvSpPr>
+            <p:cNvPr id="2" name="Abgerundetes Rechteck 1"/>
+            <p:cNvSpPr/>
+            <p:nvPr/>
+          </p:nvSpPr>
+          <p:spPr>
+            <a:xfrm>
+              <a:off x="3290888" y="2271713"/>
+              <a:ext cx="623887" cy="442912"/>
+            </a:xfrm>
+            <a:prstGeom prst="roundRect">
+              <a:avLst/>
+            </a:prstGeom>
+            <a:solidFill>
+              <a:srgbClr val="00B050"/>
+            </a:solidFill>
+            <a:ln>
+              <a:solidFill>
+                <a:srgbClr val="00B050"/>
+              </a:solidFill>
+            </a:ln>
+          </p:spPr>
+          <p:style>
+            <a:lnRef idx="1">
+              <a:schemeClr val="accent1"/>
+            </a:lnRef>
+            <a:fillRef idx="3">
+              <a:schemeClr val="accent1"/>
+            </a:fillRef>
+            <a:effectRef idx="2">
+              <a:schemeClr val="accent1"/>
+            </a:effectRef>
+            <a:fontRef idx="minor">
+              <a:schemeClr val="lt1"/>
+            </a:fontRef>
+          </p:style>
+          <p:txBody>
+            <a:bodyPr rtlCol="0" anchor="ctr"/>
+            <a:lstStyle/>
+            <a:p>
+              <a:pPr algn="ctr"/>
+              <a:endParaRPr lang="de-DE"/>
+            </a:p>
+          </p:txBody>
+        </p:sp>
+        <p:sp>
+          <p:nvSpPr>
+            <p:cNvPr id="6" name="Abgerundetes Rechteck 5"/>
+            <p:cNvSpPr/>
+            <p:nvPr/>
+          </p:nvSpPr>
+          <p:spPr>
+            <a:xfrm>
+              <a:off x="4919663" y="2271713"/>
+              <a:ext cx="623887" cy="442912"/>
+            </a:xfrm>
+            <a:prstGeom prst="roundRect">
+              <a:avLst/>
+            </a:prstGeom>
+            <a:solidFill>
+              <a:srgbClr val="C00000"/>
+            </a:solidFill>
+            <a:ln>
+              <a:solidFill>
+                <a:srgbClr val="C00000"/>
+              </a:solidFill>
+            </a:ln>
+          </p:spPr>
+          <p:style>
+            <a:lnRef idx="1">
+              <a:schemeClr val="accent1"/>
+            </a:lnRef>
+            <a:fillRef idx="3">
+              <a:schemeClr val="accent1"/>
+            </a:fillRef>
+            <a:effectRef idx="2">
+              <a:schemeClr val="accent1"/>
+            </a:effectRef>
+            <a:fontRef idx="minor">
+              <a:schemeClr val="lt1"/>
+            </a:fontRef>
+          </p:style>
+          <p:txBody>
+            <a:bodyPr rtlCol="0" anchor="ctr"/>
+            <a:lstStyle/>
+            <a:p>
+              <a:pPr algn="ctr"/>
+              <a:endParaRPr lang="de-DE"/>
+            </a:p>
+          </p:txBody>
+        </p:sp>
+        <p:sp>
+          <p:nvSpPr>
+            <p:cNvPr id="7" name="Abgerundetes Rechteck 6"/>
+            <p:cNvSpPr/>
+            <p:nvPr/>
+          </p:nvSpPr>
+          <p:spPr>
+            <a:xfrm>
+              <a:off x="3290887" y="3676065"/>
+              <a:ext cx="623887" cy="442912"/>
+            </a:xfrm>
+            <a:prstGeom prst="roundRect">
+              <a:avLst/>
+            </a:prstGeom>
+            <a:solidFill>
+              <a:srgbClr val="0070C0"/>
+            </a:solidFill>
+            <a:ln>
+              <a:solidFill>
+                <a:srgbClr val="0070C0"/>
+              </a:solidFill>
+            </a:ln>
+          </p:spPr>
+          <p:style>
+            <a:lnRef idx="1">
+              <a:schemeClr val="accent1"/>
+            </a:lnRef>
+            <a:fillRef idx="3">
+              <a:schemeClr val="accent1"/>
+            </a:fillRef>
+            <a:effectRef idx="2">
+              <a:schemeClr val="accent1"/>
+            </a:effectRef>
+            <a:fontRef idx="minor">
+              <a:schemeClr val="lt1"/>
+            </a:fontRef>
+          </p:style>
+          <p:txBody>
+            <a:bodyPr rtlCol="0" anchor="ctr"/>
+            <a:lstStyle/>
+            <a:p>
+              <a:pPr algn="ctr"/>
+              <a:endParaRPr lang="de-DE"/>
+            </a:p>
+          </p:txBody>
+        </p:sp>
+        <p:sp>
+          <p:nvSpPr>
+            <p:cNvPr id="8" name="Abgerundetes Rechteck 7"/>
+            <p:cNvSpPr/>
+            <p:nvPr/>
+          </p:nvSpPr>
+          <p:spPr>
+            <a:xfrm>
+              <a:off x="4919663" y="3676065"/>
+              <a:ext cx="623887" cy="442912"/>
+            </a:xfrm>
+            <a:prstGeom prst="roundRect">
+              <a:avLst/>
+            </a:prstGeom>
+            <a:solidFill>
+              <a:srgbClr val="FFFF00"/>
+            </a:solidFill>
+            <a:ln>
+              <a:solidFill>
+                <a:srgbClr val="FFFF00"/>
+              </a:solidFill>
+            </a:ln>
+          </p:spPr>
+          <p:style>
+            <a:lnRef idx="1">
+              <a:schemeClr val="accent1"/>
+            </a:lnRef>
+            <a:fillRef idx="3">
+              <a:schemeClr val="accent1"/>
+            </a:fillRef>
+            <a:effectRef idx="2">
+              <a:schemeClr val="accent1"/>
+            </a:effectRef>
+            <a:fontRef idx="minor">
+              <a:schemeClr val="lt1"/>
+            </a:fontRef>
+          </p:style>
+          <p:txBody>
+            <a:bodyPr rtlCol="0" anchor="ctr"/>
+            <a:lstStyle/>
+            <a:p>
+              <a:pPr algn="ctr"/>
+              <a:endParaRPr lang="de-DE"/>
+            </a:p>
+          </p:txBody>
+        </p:sp>
+        <p:sp>
+          <p:nvSpPr>
+            <p:cNvPr id="9" name="Abgerundetes Rechteck 8"/>
+            <p:cNvSpPr/>
+            <p:nvPr/>
+          </p:nvSpPr>
+          <p:spPr>
+            <a:xfrm>
+              <a:off x="2225913" y="2973610"/>
+              <a:ext cx="422038" cy="281573"/>
+            </a:xfrm>
+            <a:prstGeom prst="roundRect">
+              <a:avLst/>
+            </a:prstGeom>
+            <a:solidFill>
+              <a:srgbClr val="0070C0"/>
+            </a:solidFill>
+            <a:ln>
+              <a:solidFill>
+                <a:srgbClr val="0070C0"/>
+              </a:solidFill>
+            </a:ln>
+          </p:spPr>
+          <p:style>
+            <a:lnRef idx="1">
+              <a:schemeClr val="accent1"/>
+            </a:lnRef>
+            <a:fillRef idx="3">
+              <a:schemeClr val="accent1"/>
+            </a:fillRef>
+            <a:effectRef idx="2">
+              <a:schemeClr val="accent1"/>
+            </a:effectRef>
+            <a:fontRef idx="minor">
+              <a:schemeClr val="lt1"/>
+            </a:fontRef>
+          </p:style>
+          <p:txBody>
+            <a:bodyPr rtlCol="0" anchor="ctr"/>
+            <a:lstStyle/>
+            <a:p>
+              <a:pPr algn="ctr"/>
+              <a:endParaRPr lang="de-DE" dirty="0"/>
+            </a:p>
+          </p:txBody>
+        </p:sp>
+        <p:sp>
+          <p:nvSpPr>
+            <p:cNvPr id="10" name="Pfeil nach rechts 9"/>
+            <p:cNvSpPr/>
+            <p:nvPr/>
+          </p:nvSpPr>
+          <p:spPr>
+            <a:xfrm rot="10800000">
+              <a:off x="2314571" y="3090580"/>
+              <a:ext cx="219075" cy="45719"/>
+            </a:xfrm>
+            <a:prstGeom prst="rightArrow">
+              <a:avLst/>
+            </a:prstGeom>
+            <a:solidFill>
+              <a:schemeClr val="bg1"/>
+            </a:solidFill>
+            <a:ln>
+              <a:solidFill>
+                <a:schemeClr val="bg1"/>
+              </a:solidFill>
+            </a:ln>
+          </p:spPr>
+          <p:style>
+            <a:lnRef idx="2">
+              <a:schemeClr val="dk1"/>
+            </a:lnRef>
+            <a:fillRef idx="1">
+              <a:schemeClr val="lt1"/>
+            </a:fillRef>
+            <a:effectRef idx="0">
+              <a:schemeClr val="dk1"/>
+            </a:effectRef>
+            <a:fontRef idx="minor">
+              <a:schemeClr val="dk1"/>
+            </a:fontRef>
+          </p:style>
+          <p:txBody>
+            <a:bodyPr rtlCol="0" anchor="ctr"/>
+            <a:lstStyle/>
+            <a:p>
+              <a:pPr algn="ctr"/>
+              <a:endParaRPr lang="de-DE"/>
+            </a:p>
+          </p:txBody>
+        </p:sp>
+        <p:sp>
+          <p:nvSpPr>
+            <p:cNvPr id="11" name="Abgerundetes Rechteck 10"/>
+            <p:cNvSpPr/>
+            <p:nvPr/>
+          </p:nvSpPr>
+          <p:spPr>
+            <a:xfrm rot="10800000">
+              <a:off x="6212125" y="2973610"/>
+              <a:ext cx="422038" cy="281573"/>
+            </a:xfrm>
+            <a:prstGeom prst="roundRect">
+              <a:avLst/>
+            </a:prstGeom>
+            <a:solidFill>
+              <a:srgbClr val="0070C0"/>
+            </a:solidFill>
+            <a:ln>
+              <a:solidFill>
+                <a:srgbClr val="0070C0"/>
+              </a:solidFill>
+            </a:ln>
+          </p:spPr>
+          <p:style>
+            <a:lnRef idx="1">
+              <a:schemeClr val="accent1"/>
+            </a:lnRef>
+            <a:fillRef idx="3">
+              <a:schemeClr val="accent1"/>
+            </a:fillRef>
+            <a:effectRef idx="2">
+              <a:schemeClr val="accent1"/>
+            </a:effectRef>
+            <a:fontRef idx="minor">
+              <a:schemeClr val="lt1"/>
+            </a:fontRef>
+          </p:style>
+          <p:txBody>
+            <a:bodyPr rtlCol="0" anchor="ctr"/>
+            <a:lstStyle/>
+            <a:p>
+              <a:pPr algn="ctr"/>
+              <a:endParaRPr lang="de-DE" dirty="0"/>
+            </a:p>
+          </p:txBody>
+        </p:sp>
+        <p:sp>
+          <p:nvSpPr>
+            <p:cNvPr id="12" name="Pfeil nach rechts 11"/>
+            <p:cNvSpPr/>
+            <p:nvPr/>
+          </p:nvSpPr>
+          <p:spPr>
+            <a:xfrm>
+              <a:off x="6300783" y="3090580"/>
+              <a:ext cx="219075" cy="45719"/>
+            </a:xfrm>
+            <a:prstGeom prst="rightArrow">
+              <a:avLst/>
+            </a:prstGeom>
+            <a:solidFill>
+              <a:schemeClr val="bg1"/>
+            </a:solidFill>
+            <a:ln>
+              <a:solidFill>
+                <a:schemeClr val="bg1"/>
+              </a:solidFill>
+            </a:ln>
+          </p:spPr>
+          <p:style>
+            <a:lnRef idx="2">
+              <a:schemeClr val="dk1"/>
+            </a:lnRef>
+            <a:fillRef idx="1">
+              <a:schemeClr val="lt1"/>
+            </a:fillRef>
+            <a:effectRef idx="0">
+              <a:schemeClr val="dk1"/>
+            </a:effectRef>
+            <a:fontRef idx="minor">
+              <a:schemeClr val="dk1"/>
+            </a:fontRef>
+          </p:style>
+          <p:txBody>
+            <a:bodyPr rtlCol="0" anchor="ctr"/>
+            <a:lstStyle/>
+            <a:p>
+              <a:pPr algn="ctr"/>
+              <a:endParaRPr lang="de-DE"/>
+            </a:p>
+          </p:txBody>
+        </p:sp>
+      </p:grpSp>
     </p:spTree>
     <p:extLst>
       <p:ext uri="{BB962C8B-B14F-4D97-AF65-F5344CB8AC3E}">
-        <p14:creationId xmlns:p14="http://schemas.microsoft.com/office/powerpoint/2010/main" val="4135321886"/>
+        <p14:creationId xmlns:p14="http://schemas.microsoft.com/office/powerpoint/2010/main" val="3521823961"/>
       </p:ext>
     </p:extLst>
   </p:cSld>
@@ -3477,8 +3954,8 @@
         </p:nvSpPr>
         <p:spPr>
           <a:xfrm>
-            <a:off x="2178287" y="315672"/>
-            <a:ext cx="7774486" cy="6740307"/>
+            <a:off x="2178287" y="315671"/>
+            <a:ext cx="7774486" cy="7478970"/>
           </a:xfrm>
           <a:prstGeom prst="rect">
             <a:avLst/>
@@ -3496,15 +3973,15 @@
           <a:p>
             <a:r>
               <a:rPr lang="en-US" sz="2400" dirty="0"/>
-              <a:t>In addition to the visual task, there will be an auditory task as well. Therefore, </a:t>
+              <a:t>At the beginning of each sequence, we will show you </a:t>
             </a:r>
             <a:r>
               <a:rPr lang="en-US" sz="2400" b="1" dirty="0"/>
-              <a:t>a tone</a:t>
-            </a:r>
-            <a:r>
-              <a:rPr lang="en-US" sz="2400" dirty="0"/>
-              <a:t> will occur during or shortly after the visual image.</a:t>
+              <a:t>two specific “target” images </a:t>
+            </a:r>
+            <a:r>
+              <a:rPr lang="en-US" sz="2400" dirty="0"/>
+              <a:t>that you will need to remember and be on the lookout for. </a:t>
             </a:r>
           </a:p>
           <a:p>
@@ -3513,91 +3990,96 @@
           <a:p>
             <a:r>
               <a:rPr lang="en-US" sz="2400" dirty="0"/>
-              <a:t>Your task will be to discriminate </a:t>
+              <a:t>Your main task will be to attentively look at each image for as long as it’s on the screen, </a:t>
+            </a:r>
+            <a:r>
+              <a:rPr lang="en-US" sz="2400" dirty="0" smtClean="0"/>
+              <a:t>and </a:t>
+            </a:r>
+            <a:r>
+              <a:rPr lang="en-US" sz="2400" b="1" dirty="0" smtClean="0"/>
+              <a:t>press the</a:t>
             </a:r>
             <a:r>
               <a:rPr lang="en-US" sz="2400" b="1" dirty="0"/>
-              <a:t>“high” and “low” pitches </a:t>
-            </a:r>
-            <a:r>
-              <a:rPr lang="en-US" sz="2400" dirty="0"/>
-              <a:t>of the tone. Use the </a:t>
+              <a:t> </a:t>
             </a:r>
             <a:r>
               <a:rPr lang="en-US" sz="2400" b="1" dirty="0" smtClean="0"/>
-              <a:t>“1” key </a:t>
+              <a:t>green </a:t>
+            </a:r>
+            <a:r>
+              <a:rPr lang="en-US" sz="2400" b="1" dirty="0"/>
+              <a:t>button </a:t>
+            </a:r>
+            <a:r>
+              <a:rPr lang="en-US" sz="2400" dirty="0"/>
+              <a:t>whenever </a:t>
+            </a:r>
+            <a:r>
+              <a:rPr lang="en-US" sz="2400" dirty="0"/>
+              <a:t>you see a </a:t>
+            </a:r>
+            <a:r>
+              <a:rPr lang="en-US" sz="2400" b="1" dirty="0"/>
+              <a:t>target </a:t>
+            </a:r>
+            <a:r>
+              <a:rPr lang="en-US" sz="2400" b="1" dirty="0" smtClean="0"/>
+              <a:t>image </a:t>
             </a:r>
             <a:r>
               <a:rPr lang="en-US" sz="2400" dirty="0" smtClean="0"/>
-              <a:t>to </a:t>
-            </a:r>
-            <a:r>
-              <a:rPr lang="en-US" sz="2400" dirty="0"/>
-              <a:t>respond to </a:t>
-            </a:r>
-            <a:r>
-              <a:rPr lang="en-US" sz="2400" b="1" dirty="0" smtClean="0"/>
-              <a:t>high tone </a:t>
-            </a:r>
-            <a:r>
-              <a:rPr lang="en-US" sz="2400" dirty="0"/>
-              <a:t>and the </a:t>
-            </a:r>
-            <a:r>
-              <a:rPr lang="en-US" sz="2400" b="1" dirty="0" smtClean="0"/>
-              <a:t>“2” key </a:t>
-            </a:r>
-            <a:r>
-              <a:rPr lang="en-US" sz="2400" b="1" dirty="0" smtClean="0"/>
-              <a:t>for </a:t>
-            </a:r>
-            <a:r>
-              <a:rPr lang="en-US" sz="2400" b="1" dirty="0" smtClean="0"/>
-              <a:t>low tones</a:t>
-            </a:r>
+              <a:t>in </a:t>
+            </a:r>
+            <a:r>
+              <a:rPr lang="en-US" sz="2400" dirty="0"/>
+              <a:t>any view (front or side).</a:t>
+            </a:r>
+          </a:p>
+          <a:p>
             <a:r>
               <a:rPr lang="en-US" sz="2400" dirty="0" smtClean="0"/>
-              <a:t>. </a:t>
-            </a:r>
-          </a:p>
-          <a:p>
+              <a:t>Please respond</a:t>
+            </a:r>
+            <a:r>
+              <a:rPr lang="en-US" sz="2400" dirty="0"/>
+              <a:t> as quickly and as accurately as </a:t>
+            </a:r>
+            <a:r>
+              <a:rPr lang="en-US" sz="2400" dirty="0" smtClean="0"/>
+              <a:t>possible.</a:t>
+            </a:r>
             <a:endParaRPr lang="en-US" sz="2400" dirty="0"/>
           </a:p>
           <a:p>
+            <a:endParaRPr lang="en-US" sz="2400" dirty="0"/>
+          </a:p>
+          <a:p>
+            <a:endParaRPr lang="en-US" sz="2400" dirty="0" smtClean="0"/>
+          </a:p>
+          <a:p>
+            <a:endParaRPr lang="en-US" sz="2400" dirty="0" smtClean="0"/>
+          </a:p>
+          <a:p>
+            <a:endParaRPr lang="en-US" sz="2400" dirty="0"/>
+          </a:p>
+          <a:p>
+            <a:endParaRPr lang="en-US" sz="2400" dirty="0"/>
+          </a:p>
+          <a:p>
+            <a:pPr algn="ctr"/>
+            <a:endParaRPr lang="en-US" sz="2400" dirty="0" smtClean="0"/>
+          </a:p>
+          <a:p>
+            <a:pPr algn="ctr"/>
             <a:r>
               <a:rPr lang="en-US" sz="2400" dirty="0" smtClean="0"/>
-              <a:t>Please </a:t>
-            </a:r>
-            <a:r>
-              <a:rPr lang="en-US" sz="2400" dirty="0"/>
-              <a:t>respond as quickly and as accurately as possible. Always respond </a:t>
-            </a:r>
-            <a:r>
-              <a:rPr lang="en-US" sz="2400" b="1" dirty="0"/>
-              <a:t>first to the visual</a:t>
-            </a:r>
-            <a:r>
-              <a:rPr lang="en-US" sz="2400" dirty="0"/>
-              <a:t> and then to the auditory task.</a:t>
-            </a:r>
-          </a:p>
-          <a:p>
-            <a:endParaRPr lang="en-US" sz="2400" dirty="0"/>
-          </a:p>
-          <a:p>
-            <a:r>
-              <a:rPr lang="en-US" sz="2400" dirty="0"/>
-              <a:t>  </a:t>
-            </a:r>
-          </a:p>
-          <a:p>
-            <a:endParaRPr lang="en-US" sz="2400" dirty="0"/>
-          </a:p>
-          <a:p>
-            <a:pPr algn="ctr"/>
-            <a:r>
-              <a:rPr lang="en-US" sz="2400" dirty="0"/>
-              <a:t>Press the </a:t>
+              <a:t>Press </a:t>
+            </a:r>
+            <a:r>
+              <a:rPr lang="en-US" sz="2400" dirty="0"/>
+              <a:t>the </a:t>
             </a:r>
             <a:r>
               <a:rPr lang="en-US" sz="2400" b="1" dirty="0"/>
@@ -3629,14 +4111,439 @@
             </a:r>
           </a:p>
           <a:p>
+            <a:pPr algn="ctr"/>
             <a:endParaRPr lang="en-US" sz="2400" dirty="0"/>
           </a:p>
-        </p:txBody>
-      </p:sp>
+          <a:p>
+            <a:endParaRPr lang="en-US" sz="2400" dirty="0"/>
+          </a:p>
+          <a:p>
+            <a:endParaRPr lang="en-US" sz="2400" dirty="0"/>
+          </a:p>
+        </p:txBody>
+      </p:sp>
+      <p:grpSp>
+        <p:nvGrpSpPr>
+          <p:cNvPr id="13" name="Gruppieren 12"/>
+          <p:cNvGrpSpPr/>
+          <p:nvPr/>
+        </p:nvGrpSpPr>
+        <p:grpSpPr>
+          <a:xfrm>
+            <a:off x="5121520" y="3837626"/>
+            <a:ext cx="1888019" cy="1599765"/>
+            <a:chOff x="1866122" y="1498567"/>
+            <a:chExt cx="5075854" cy="3250713"/>
+          </a:xfrm>
+        </p:grpSpPr>
+        <p:pic>
+          <p:nvPicPr>
+            <p:cNvPr id="5" name="Grafik 4"/>
+            <p:cNvPicPr/>
+            <p:nvPr/>
+          </p:nvPicPr>
+          <p:blipFill rotWithShape="1">
+            <a:blip r:embed="rId2" cstate="hqprint">
+              <a:extLst>
+                <a:ext uri="{28A0092B-C50C-407E-A947-70E740481C1C}">
+                  <a14:useLocalDpi xmlns:a14="http://schemas.microsoft.com/office/drawing/2010/main" val="0"/>
+                </a:ext>
+              </a:extLst>
+            </a:blip>
+            <a:srcRect/>
+            <a:stretch/>
+          </p:blipFill>
+          <p:spPr bwMode="auto">
+            <a:xfrm>
+              <a:off x="1866122" y="1498567"/>
+              <a:ext cx="5075854" cy="3250713"/>
+            </a:xfrm>
+            <a:prstGeom prst="rect">
+              <a:avLst/>
+            </a:prstGeom>
+            <a:ln>
+              <a:noFill/>
+            </a:ln>
+            <a:extLst>
+              <a:ext uri="{53640926-AAD7-44D8-BBD7-CCE9431645EC}">
+                <a14:shadowObscured xmlns:a14="http://schemas.microsoft.com/office/drawing/2010/main"/>
+              </a:ext>
+            </a:extLst>
+          </p:spPr>
+        </p:pic>
+        <p:sp>
+          <p:nvSpPr>
+            <p:cNvPr id="2" name="Abgerundetes Rechteck 1"/>
+            <p:cNvSpPr/>
+            <p:nvPr/>
+          </p:nvSpPr>
+          <p:spPr>
+            <a:xfrm>
+              <a:off x="3290888" y="2271713"/>
+              <a:ext cx="623887" cy="442912"/>
+            </a:xfrm>
+            <a:prstGeom prst="roundRect">
+              <a:avLst/>
+            </a:prstGeom>
+            <a:solidFill>
+              <a:srgbClr val="00B050"/>
+            </a:solidFill>
+            <a:ln>
+              <a:solidFill>
+                <a:srgbClr val="00B050"/>
+              </a:solidFill>
+            </a:ln>
+          </p:spPr>
+          <p:style>
+            <a:lnRef idx="1">
+              <a:schemeClr val="accent1"/>
+            </a:lnRef>
+            <a:fillRef idx="3">
+              <a:schemeClr val="accent1"/>
+            </a:fillRef>
+            <a:effectRef idx="2">
+              <a:schemeClr val="accent1"/>
+            </a:effectRef>
+            <a:fontRef idx="minor">
+              <a:schemeClr val="lt1"/>
+            </a:fontRef>
+          </p:style>
+          <p:txBody>
+            <a:bodyPr rtlCol="0" anchor="ctr"/>
+            <a:lstStyle/>
+            <a:p>
+              <a:pPr algn="ctr"/>
+              <a:endParaRPr lang="de-DE"/>
+            </a:p>
+          </p:txBody>
+        </p:sp>
+        <p:sp>
+          <p:nvSpPr>
+            <p:cNvPr id="6" name="Abgerundetes Rechteck 5"/>
+            <p:cNvSpPr/>
+            <p:nvPr/>
+          </p:nvSpPr>
+          <p:spPr>
+            <a:xfrm>
+              <a:off x="4919663" y="2271713"/>
+              <a:ext cx="623887" cy="442912"/>
+            </a:xfrm>
+            <a:prstGeom prst="roundRect">
+              <a:avLst/>
+            </a:prstGeom>
+            <a:solidFill>
+              <a:srgbClr val="C00000"/>
+            </a:solidFill>
+            <a:ln>
+              <a:solidFill>
+                <a:srgbClr val="C00000"/>
+              </a:solidFill>
+            </a:ln>
+          </p:spPr>
+          <p:style>
+            <a:lnRef idx="1">
+              <a:schemeClr val="accent1"/>
+            </a:lnRef>
+            <a:fillRef idx="3">
+              <a:schemeClr val="accent1"/>
+            </a:fillRef>
+            <a:effectRef idx="2">
+              <a:schemeClr val="accent1"/>
+            </a:effectRef>
+            <a:fontRef idx="minor">
+              <a:schemeClr val="lt1"/>
+            </a:fontRef>
+          </p:style>
+          <p:txBody>
+            <a:bodyPr rtlCol="0" anchor="ctr"/>
+            <a:lstStyle/>
+            <a:p>
+              <a:pPr algn="ctr"/>
+              <a:endParaRPr lang="de-DE"/>
+            </a:p>
+          </p:txBody>
+        </p:sp>
+        <p:sp>
+          <p:nvSpPr>
+            <p:cNvPr id="7" name="Abgerundetes Rechteck 6"/>
+            <p:cNvSpPr/>
+            <p:nvPr/>
+          </p:nvSpPr>
+          <p:spPr>
+            <a:xfrm>
+              <a:off x="3290887" y="3676065"/>
+              <a:ext cx="623887" cy="442912"/>
+            </a:xfrm>
+            <a:prstGeom prst="roundRect">
+              <a:avLst/>
+            </a:prstGeom>
+            <a:solidFill>
+              <a:srgbClr val="0070C0"/>
+            </a:solidFill>
+            <a:ln>
+              <a:solidFill>
+                <a:srgbClr val="0070C0"/>
+              </a:solidFill>
+            </a:ln>
+          </p:spPr>
+          <p:style>
+            <a:lnRef idx="1">
+              <a:schemeClr val="accent1"/>
+            </a:lnRef>
+            <a:fillRef idx="3">
+              <a:schemeClr val="accent1"/>
+            </a:fillRef>
+            <a:effectRef idx="2">
+              <a:schemeClr val="accent1"/>
+            </a:effectRef>
+            <a:fontRef idx="minor">
+              <a:schemeClr val="lt1"/>
+            </a:fontRef>
+          </p:style>
+          <p:txBody>
+            <a:bodyPr rtlCol="0" anchor="ctr"/>
+            <a:lstStyle/>
+            <a:p>
+              <a:pPr algn="ctr"/>
+              <a:endParaRPr lang="de-DE"/>
+            </a:p>
+          </p:txBody>
+        </p:sp>
+        <p:sp>
+          <p:nvSpPr>
+            <p:cNvPr id="8" name="Abgerundetes Rechteck 7"/>
+            <p:cNvSpPr/>
+            <p:nvPr/>
+          </p:nvSpPr>
+          <p:spPr>
+            <a:xfrm>
+              <a:off x="4919663" y="3676065"/>
+              <a:ext cx="623887" cy="442912"/>
+            </a:xfrm>
+            <a:prstGeom prst="roundRect">
+              <a:avLst/>
+            </a:prstGeom>
+            <a:solidFill>
+              <a:srgbClr val="FFFF00"/>
+            </a:solidFill>
+            <a:ln>
+              <a:solidFill>
+                <a:srgbClr val="FFFF00"/>
+              </a:solidFill>
+            </a:ln>
+          </p:spPr>
+          <p:style>
+            <a:lnRef idx="1">
+              <a:schemeClr val="accent1"/>
+            </a:lnRef>
+            <a:fillRef idx="3">
+              <a:schemeClr val="accent1"/>
+            </a:fillRef>
+            <a:effectRef idx="2">
+              <a:schemeClr val="accent1"/>
+            </a:effectRef>
+            <a:fontRef idx="minor">
+              <a:schemeClr val="lt1"/>
+            </a:fontRef>
+          </p:style>
+          <p:txBody>
+            <a:bodyPr rtlCol="0" anchor="ctr"/>
+            <a:lstStyle/>
+            <a:p>
+              <a:pPr algn="ctr"/>
+              <a:endParaRPr lang="de-DE"/>
+            </a:p>
+          </p:txBody>
+        </p:sp>
+        <p:sp>
+          <p:nvSpPr>
+            <p:cNvPr id="9" name="Abgerundetes Rechteck 8"/>
+            <p:cNvSpPr/>
+            <p:nvPr/>
+          </p:nvSpPr>
+          <p:spPr>
+            <a:xfrm>
+              <a:off x="2225913" y="2973610"/>
+              <a:ext cx="422038" cy="281573"/>
+            </a:xfrm>
+            <a:prstGeom prst="roundRect">
+              <a:avLst/>
+            </a:prstGeom>
+            <a:solidFill>
+              <a:srgbClr val="0070C0"/>
+            </a:solidFill>
+            <a:ln>
+              <a:solidFill>
+                <a:srgbClr val="0070C0"/>
+              </a:solidFill>
+            </a:ln>
+          </p:spPr>
+          <p:style>
+            <a:lnRef idx="1">
+              <a:schemeClr val="accent1"/>
+            </a:lnRef>
+            <a:fillRef idx="3">
+              <a:schemeClr val="accent1"/>
+            </a:fillRef>
+            <a:effectRef idx="2">
+              <a:schemeClr val="accent1"/>
+            </a:effectRef>
+            <a:fontRef idx="minor">
+              <a:schemeClr val="lt1"/>
+            </a:fontRef>
+          </p:style>
+          <p:txBody>
+            <a:bodyPr rtlCol="0" anchor="ctr"/>
+            <a:lstStyle/>
+            <a:p>
+              <a:pPr algn="ctr"/>
+              <a:endParaRPr lang="de-DE" dirty="0"/>
+            </a:p>
+          </p:txBody>
+        </p:sp>
+        <p:sp>
+          <p:nvSpPr>
+            <p:cNvPr id="10" name="Pfeil nach rechts 9"/>
+            <p:cNvSpPr/>
+            <p:nvPr/>
+          </p:nvSpPr>
+          <p:spPr>
+            <a:xfrm rot="10800000">
+              <a:off x="2314571" y="3090580"/>
+              <a:ext cx="219075" cy="45719"/>
+            </a:xfrm>
+            <a:prstGeom prst="rightArrow">
+              <a:avLst/>
+            </a:prstGeom>
+            <a:solidFill>
+              <a:schemeClr val="bg1"/>
+            </a:solidFill>
+            <a:ln>
+              <a:solidFill>
+                <a:schemeClr val="bg1"/>
+              </a:solidFill>
+            </a:ln>
+          </p:spPr>
+          <p:style>
+            <a:lnRef idx="2">
+              <a:schemeClr val="dk1"/>
+            </a:lnRef>
+            <a:fillRef idx="1">
+              <a:schemeClr val="lt1"/>
+            </a:fillRef>
+            <a:effectRef idx="0">
+              <a:schemeClr val="dk1"/>
+            </a:effectRef>
+            <a:fontRef idx="minor">
+              <a:schemeClr val="dk1"/>
+            </a:fontRef>
+          </p:style>
+          <p:txBody>
+            <a:bodyPr rtlCol="0" anchor="ctr"/>
+            <a:lstStyle/>
+            <a:p>
+              <a:pPr algn="ctr"/>
+              <a:endParaRPr lang="de-DE"/>
+            </a:p>
+          </p:txBody>
+        </p:sp>
+        <p:sp>
+          <p:nvSpPr>
+            <p:cNvPr id="11" name="Abgerundetes Rechteck 10"/>
+            <p:cNvSpPr/>
+            <p:nvPr/>
+          </p:nvSpPr>
+          <p:spPr>
+            <a:xfrm rot="10800000">
+              <a:off x="6212125" y="2973610"/>
+              <a:ext cx="422038" cy="281573"/>
+            </a:xfrm>
+            <a:prstGeom prst="roundRect">
+              <a:avLst/>
+            </a:prstGeom>
+            <a:solidFill>
+              <a:srgbClr val="0070C0"/>
+            </a:solidFill>
+            <a:ln>
+              <a:solidFill>
+                <a:srgbClr val="0070C0"/>
+              </a:solidFill>
+            </a:ln>
+          </p:spPr>
+          <p:style>
+            <a:lnRef idx="1">
+              <a:schemeClr val="accent1"/>
+            </a:lnRef>
+            <a:fillRef idx="3">
+              <a:schemeClr val="accent1"/>
+            </a:fillRef>
+            <a:effectRef idx="2">
+              <a:schemeClr val="accent1"/>
+            </a:effectRef>
+            <a:fontRef idx="minor">
+              <a:schemeClr val="lt1"/>
+            </a:fontRef>
+          </p:style>
+          <p:txBody>
+            <a:bodyPr rtlCol="0" anchor="ctr"/>
+            <a:lstStyle/>
+            <a:p>
+              <a:pPr algn="ctr"/>
+              <a:endParaRPr lang="de-DE" dirty="0"/>
+            </a:p>
+          </p:txBody>
+        </p:sp>
+        <p:sp>
+          <p:nvSpPr>
+            <p:cNvPr id="12" name="Pfeil nach rechts 11"/>
+            <p:cNvSpPr/>
+            <p:nvPr/>
+          </p:nvSpPr>
+          <p:spPr>
+            <a:xfrm>
+              <a:off x="6300783" y="3090580"/>
+              <a:ext cx="219075" cy="45719"/>
+            </a:xfrm>
+            <a:prstGeom prst="rightArrow">
+              <a:avLst/>
+            </a:prstGeom>
+            <a:solidFill>
+              <a:schemeClr val="bg1"/>
+            </a:solidFill>
+            <a:ln>
+              <a:solidFill>
+                <a:schemeClr val="bg1"/>
+              </a:solidFill>
+            </a:ln>
+          </p:spPr>
+          <p:style>
+            <a:lnRef idx="2">
+              <a:schemeClr val="dk1"/>
+            </a:lnRef>
+            <a:fillRef idx="1">
+              <a:schemeClr val="lt1"/>
+            </a:fillRef>
+            <a:effectRef idx="0">
+              <a:schemeClr val="dk1"/>
+            </a:effectRef>
+            <a:fontRef idx="minor">
+              <a:schemeClr val="dk1"/>
+            </a:fontRef>
+          </p:style>
+          <p:txBody>
+            <a:bodyPr rtlCol="0" anchor="ctr"/>
+            <a:lstStyle/>
+            <a:p>
+              <a:pPr algn="ctr"/>
+              <a:endParaRPr lang="de-DE"/>
+            </a:p>
+          </p:txBody>
+        </p:sp>
+      </p:grpSp>
     </p:spTree>
     <p:extLst>
       <p:ext uri="{BB962C8B-B14F-4D97-AF65-F5344CB8AC3E}">
-        <p14:creationId xmlns:p14="http://schemas.microsoft.com/office/powerpoint/2010/main" val="3993068824"/>
+        <p14:creationId xmlns:p14="http://schemas.microsoft.com/office/powerpoint/2010/main" val="2019135309"/>
       </p:ext>
     </p:extLst>
   </p:cSld>
@@ -3671,8 +4578,8 @@
         </p:nvSpPr>
         <p:spPr>
           <a:xfrm>
-            <a:off x="2178287" y="294605"/>
-            <a:ext cx="7774486" cy="7109639"/>
+            <a:off x="2178287" y="315672"/>
+            <a:ext cx="7774486" cy="6740307"/>
           </a:xfrm>
           <a:prstGeom prst="rect">
             <a:avLst/>
@@ -3690,7 +4597,15 @@
           <a:p>
             <a:r>
               <a:rPr lang="en-US" sz="2400" dirty="0"/>
-              <a:t>Each sequence will last about 1min 30sec. You will be able to rest between sequences. The sequence will only begin after you press the space bar.</a:t>
+              <a:t>In addition to the visual task, there will be an auditory task as well. Therefore, </a:t>
+            </a:r>
+            <a:r>
+              <a:rPr lang="en-US" sz="2400" b="1" dirty="0"/>
+              <a:t>a tone</a:t>
+            </a:r>
+            <a:r>
+              <a:rPr lang="en-US" sz="2400" dirty="0"/>
+              <a:t> will occur during or shortly after the visual image.</a:t>
             </a:r>
           </a:p>
           <a:p>
@@ -3699,8 +4614,69 @@
           <a:p>
             <a:r>
               <a:rPr lang="en-US" sz="2400" dirty="0"/>
-              <a:t>Please do your best to remain focused and alert, and keep your eyes fixed on the center of the screen. </a:t>
-            </a:r>
+              <a:t>Your task will be to discriminate </a:t>
+            </a:r>
+            <a:r>
+              <a:rPr lang="en-US" sz="2400" b="1" dirty="0"/>
+              <a:t>“high” and “low” pitches </a:t>
+            </a:r>
+            <a:r>
+              <a:rPr lang="en-US" sz="2400" dirty="0"/>
+              <a:t>of the tone. Use the </a:t>
+            </a:r>
+            <a:r>
+              <a:rPr lang="en-US" sz="2400" b="1" dirty="0" smtClean="0"/>
+              <a:t>red button </a:t>
+            </a:r>
+            <a:r>
+              <a:rPr lang="en-US" sz="2400" dirty="0" smtClean="0"/>
+              <a:t>to </a:t>
+            </a:r>
+            <a:r>
+              <a:rPr lang="en-US" sz="2400" dirty="0"/>
+              <a:t>respond to </a:t>
+            </a:r>
+            <a:r>
+              <a:rPr lang="en-US" sz="2400" b="1" dirty="0" smtClean="0"/>
+              <a:t>high tone </a:t>
+            </a:r>
+            <a:r>
+              <a:rPr lang="en-US" sz="2400" dirty="0"/>
+              <a:t>and the </a:t>
+            </a:r>
+            <a:r>
+              <a:rPr lang="en-US" sz="2400" b="1" dirty="0" smtClean="0"/>
+              <a:t>yellow button for </a:t>
+            </a:r>
+            <a:r>
+              <a:rPr lang="en-US" sz="2400" b="1" dirty="0" smtClean="0"/>
+              <a:t>low tones</a:t>
+            </a:r>
+            <a:r>
+              <a:rPr lang="en-US" sz="2400" dirty="0" smtClean="0"/>
+              <a:t>. </a:t>
+            </a:r>
+          </a:p>
+          <a:p>
+            <a:r>
+              <a:rPr lang="en-US" sz="2400" dirty="0" smtClean="0"/>
+              <a:t>Please </a:t>
+            </a:r>
+            <a:r>
+              <a:rPr lang="en-US" sz="2400" dirty="0"/>
+              <a:t>respond as quickly and as accurately as possible. Always respond </a:t>
+            </a:r>
+            <a:r>
+              <a:rPr lang="en-US" sz="2400" b="1" dirty="0"/>
+              <a:t>first to the visual</a:t>
+            </a:r>
+            <a:r>
+              <a:rPr lang="en-US" sz="2400" dirty="0"/>
+              <a:t> and then to the auditory task.</a:t>
+            </a:r>
+          </a:p>
+          <a:p>
+            <a:endParaRPr lang="en-US" sz="2400" dirty="0" smtClean="0"/>
           </a:p>
           <a:p>
             <a:endParaRPr lang="en-US" sz="2400" dirty="0"/>
@@ -3708,27 +4684,10 @@
           <a:p>
             <a:r>
               <a:rPr lang="en-US" sz="2400" dirty="0"/>
-              <a:t>If you need a break, or have any questions, do not hesitate to ask the experimenter.</a:t>
-            </a:r>
-          </a:p>
-          <a:p>
-            <a:endParaRPr lang="en-US" sz="2400" dirty="0"/>
-          </a:p>
-          <a:p>
-            <a:r>
-              <a:rPr lang="en-US" sz="2400" dirty="0"/>
-              <a:t>We will start with a few practice trials, and you will have a chance to ask questions before starting the experiment.</a:t>
-            </a:r>
-          </a:p>
-          <a:p>
-            <a:r>
-              <a:rPr lang="en-US" sz="2400" b="1" dirty="0"/>
-              <a:t>Good luck!</a:t>
-            </a:r>
-            <a:endParaRPr lang="en-US" sz="2400" dirty="0"/>
-          </a:p>
-          <a:p>
-            <a:pPr algn="ctr"/>
+              <a:t>  </a:t>
+            </a:r>
+          </a:p>
+          <a:p>
             <a:endParaRPr lang="en-US" sz="2400" dirty="0"/>
           </a:p>
           <a:p>
@@ -3769,15 +4728,430 @@
           <a:p>
             <a:endParaRPr lang="en-US" sz="2400" dirty="0"/>
           </a:p>
-          <a:p>
-            <a:endParaRPr lang="en-US" sz="2400" dirty="0"/>
-          </a:p>
-        </p:txBody>
-      </p:sp>
+        </p:txBody>
+      </p:sp>
+      <p:grpSp>
+        <p:nvGrpSpPr>
+          <p:cNvPr id="3" name="Gruppieren 2"/>
+          <p:cNvGrpSpPr/>
+          <p:nvPr/>
+        </p:nvGrpSpPr>
+        <p:grpSpPr>
+          <a:xfrm>
+            <a:off x="5411310" y="4279935"/>
+            <a:ext cx="1395446" cy="1219279"/>
+            <a:chOff x="1866122" y="1498567"/>
+            <a:chExt cx="5075854" cy="3250713"/>
+          </a:xfrm>
+        </p:grpSpPr>
+        <p:pic>
+          <p:nvPicPr>
+            <p:cNvPr id="5" name="Grafik 4"/>
+            <p:cNvPicPr/>
+            <p:nvPr/>
+          </p:nvPicPr>
+          <p:blipFill rotWithShape="1">
+            <a:blip r:embed="rId2" cstate="hqprint">
+              <a:extLst>
+                <a:ext uri="{28A0092B-C50C-407E-A947-70E740481C1C}">
+                  <a14:useLocalDpi xmlns:a14="http://schemas.microsoft.com/office/drawing/2010/main" val="0"/>
+                </a:ext>
+              </a:extLst>
+            </a:blip>
+            <a:srcRect/>
+            <a:stretch/>
+          </p:blipFill>
+          <p:spPr bwMode="auto">
+            <a:xfrm>
+              <a:off x="1866122" y="1498567"/>
+              <a:ext cx="5075854" cy="3250713"/>
+            </a:xfrm>
+            <a:prstGeom prst="rect">
+              <a:avLst/>
+            </a:prstGeom>
+            <a:ln>
+              <a:noFill/>
+            </a:ln>
+            <a:extLst>
+              <a:ext uri="{53640926-AAD7-44D8-BBD7-CCE9431645EC}">
+                <a14:shadowObscured xmlns:a14="http://schemas.microsoft.com/office/drawing/2010/main"/>
+              </a:ext>
+            </a:extLst>
+          </p:spPr>
+        </p:pic>
+        <p:sp>
+          <p:nvSpPr>
+            <p:cNvPr id="6" name="Abgerundetes Rechteck 5"/>
+            <p:cNvSpPr/>
+            <p:nvPr/>
+          </p:nvSpPr>
+          <p:spPr>
+            <a:xfrm>
+              <a:off x="3290888" y="2271713"/>
+              <a:ext cx="623887" cy="442912"/>
+            </a:xfrm>
+            <a:prstGeom prst="roundRect">
+              <a:avLst/>
+            </a:prstGeom>
+            <a:solidFill>
+              <a:srgbClr val="00B050"/>
+            </a:solidFill>
+            <a:ln>
+              <a:solidFill>
+                <a:srgbClr val="00B050"/>
+              </a:solidFill>
+            </a:ln>
+          </p:spPr>
+          <p:style>
+            <a:lnRef idx="1">
+              <a:schemeClr val="accent1"/>
+            </a:lnRef>
+            <a:fillRef idx="3">
+              <a:schemeClr val="accent1"/>
+            </a:fillRef>
+            <a:effectRef idx="2">
+              <a:schemeClr val="accent1"/>
+            </a:effectRef>
+            <a:fontRef idx="minor">
+              <a:schemeClr val="lt1"/>
+            </a:fontRef>
+          </p:style>
+          <p:txBody>
+            <a:bodyPr rtlCol="0" anchor="ctr"/>
+            <a:lstStyle/>
+            <a:p>
+              <a:pPr algn="ctr"/>
+              <a:endParaRPr lang="de-DE"/>
+            </a:p>
+          </p:txBody>
+        </p:sp>
+        <p:sp>
+          <p:nvSpPr>
+            <p:cNvPr id="7" name="Abgerundetes Rechteck 6"/>
+            <p:cNvSpPr/>
+            <p:nvPr/>
+          </p:nvSpPr>
+          <p:spPr>
+            <a:xfrm>
+              <a:off x="4919663" y="2271713"/>
+              <a:ext cx="623887" cy="442912"/>
+            </a:xfrm>
+            <a:prstGeom prst="roundRect">
+              <a:avLst/>
+            </a:prstGeom>
+            <a:solidFill>
+              <a:srgbClr val="C00000"/>
+            </a:solidFill>
+            <a:ln>
+              <a:solidFill>
+                <a:srgbClr val="C00000"/>
+              </a:solidFill>
+            </a:ln>
+          </p:spPr>
+          <p:style>
+            <a:lnRef idx="1">
+              <a:schemeClr val="accent1"/>
+            </a:lnRef>
+            <a:fillRef idx="3">
+              <a:schemeClr val="accent1"/>
+            </a:fillRef>
+            <a:effectRef idx="2">
+              <a:schemeClr val="accent1"/>
+            </a:effectRef>
+            <a:fontRef idx="minor">
+              <a:schemeClr val="lt1"/>
+            </a:fontRef>
+          </p:style>
+          <p:txBody>
+            <a:bodyPr rtlCol="0" anchor="ctr"/>
+            <a:lstStyle/>
+            <a:p>
+              <a:pPr algn="ctr"/>
+              <a:endParaRPr lang="de-DE"/>
+            </a:p>
+          </p:txBody>
+        </p:sp>
+        <p:sp>
+          <p:nvSpPr>
+            <p:cNvPr id="8" name="Abgerundetes Rechteck 7"/>
+            <p:cNvSpPr/>
+            <p:nvPr/>
+          </p:nvSpPr>
+          <p:spPr>
+            <a:xfrm>
+              <a:off x="3290887" y="3676065"/>
+              <a:ext cx="623887" cy="442912"/>
+            </a:xfrm>
+            <a:prstGeom prst="roundRect">
+              <a:avLst/>
+            </a:prstGeom>
+            <a:solidFill>
+              <a:srgbClr val="0070C0"/>
+            </a:solidFill>
+            <a:ln>
+              <a:solidFill>
+                <a:srgbClr val="0070C0"/>
+              </a:solidFill>
+            </a:ln>
+          </p:spPr>
+          <p:style>
+            <a:lnRef idx="1">
+              <a:schemeClr val="accent1"/>
+            </a:lnRef>
+            <a:fillRef idx="3">
+              <a:schemeClr val="accent1"/>
+            </a:fillRef>
+            <a:effectRef idx="2">
+              <a:schemeClr val="accent1"/>
+            </a:effectRef>
+            <a:fontRef idx="minor">
+              <a:schemeClr val="lt1"/>
+            </a:fontRef>
+          </p:style>
+          <p:txBody>
+            <a:bodyPr rtlCol="0" anchor="ctr"/>
+            <a:lstStyle/>
+            <a:p>
+              <a:pPr algn="ctr"/>
+              <a:endParaRPr lang="de-DE"/>
+            </a:p>
+          </p:txBody>
+        </p:sp>
+        <p:sp>
+          <p:nvSpPr>
+            <p:cNvPr id="9" name="Abgerundetes Rechteck 8"/>
+            <p:cNvSpPr/>
+            <p:nvPr/>
+          </p:nvSpPr>
+          <p:spPr>
+            <a:xfrm>
+              <a:off x="4919663" y="3676065"/>
+              <a:ext cx="623887" cy="442912"/>
+            </a:xfrm>
+            <a:prstGeom prst="roundRect">
+              <a:avLst/>
+            </a:prstGeom>
+            <a:solidFill>
+              <a:srgbClr val="FFFF00"/>
+            </a:solidFill>
+            <a:ln>
+              <a:solidFill>
+                <a:srgbClr val="FFFF00"/>
+              </a:solidFill>
+            </a:ln>
+          </p:spPr>
+          <p:style>
+            <a:lnRef idx="1">
+              <a:schemeClr val="accent1"/>
+            </a:lnRef>
+            <a:fillRef idx="3">
+              <a:schemeClr val="accent1"/>
+            </a:fillRef>
+            <a:effectRef idx="2">
+              <a:schemeClr val="accent1"/>
+            </a:effectRef>
+            <a:fontRef idx="minor">
+              <a:schemeClr val="lt1"/>
+            </a:fontRef>
+          </p:style>
+          <p:txBody>
+            <a:bodyPr rtlCol="0" anchor="ctr"/>
+            <a:lstStyle/>
+            <a:p>
+              <a:pPr algn="ctr"/>
+              <a:endParaRPr lang="de-DE"/>
+            </a:p>
+          </p:txBody>
+        </p:sp>
+        <p:sp>
+          <p:nvSpPr>
+            <p:cNvPr id="10" name="Abgerundetes Rechteck 9"/>
+            <p:cNvSpPr/>
+            <p:nvPr/>
+          </p:nvSpPr>
+          <p:spPr>
+            <a:xfrm>
+              <a:off x="2225913" y="2973610"/>
+              <a:ext cx="422038" cy="281573"/>
+            </a:xfrm>
+            <a:prstGeom prst="roundRect">
+              <a:avLst/>
+            </a:prstGeom>
+            <a:solidFill>
+              <a:srgbClr val="0070C0"/>
+            </a:solidFill>
+            <a:ln>
+              <a:solidFill>
+                <a:srgbClr val="0070C0"/>
+              </a:solidFill>
+            </a:ln>
+          </p:spPr>
+          <p:style>
+            <a:lnRef idx="1">
+              <a:schemeClr val="accent1"/>
+            </a:lnRef>
+            <a:fillRef idx="3">
+              <a:schemeClr val="accent1"/>
+            </a:fillRef>
+            <a:effectRef idx="2">
+              <a:schemeClr val="accent1"/>
+            </a:effectRef>
+            <a:fontRef idx="minor">
+              <a:schemeClr val="lt1"/>
+            </a:fontRef>
+          </p:style>
+          <p:txBody>
+            <a:bodyPr rtlCol="0" anchor="ctr"/>
+            <a:lstStyle/>
+            <a:p>
+              <a:pPr algn="ctr"/>
+              <a:endParaRPr lang="de-DE" dirty="0"/>
+            </a:p>
+          </p:txBody>
+        </p:sp>
+        <p:sp>
+          <p:nvSpPr>
+            <p:cNvPr id="11" name="Pfeil nach rechts 10"/>
+            <p:cNvSpPr/>
+            <p:nvPr/>
+          </p:nvSpPr>
+          <p:spPr>
+            <a:xfrm rot="10800000">
+              <a:off x="2314571" y="3090580"/>
+              <a:ext cx="219075" cy="45719"/>
+            </a:xfrm>
+            <a:prstGeom prst="rightArrow">
+              <a:avLst/>
+            </a:prstGeom>
+            <a:solidFill>
+              <a:schemeClr val="bg1"/>
+            </a:solidFill>
+            <a:ln>
+              <a:solidFill>
+                <a:schemeClr val="bg1"/>
+              </a:solidFill>
+            </a:ln>
+          </p:spPr>
+          <p:style>
+            <a:lnRef idx="2">
+              <a:schemeClr val="dk1"/>
+            </a:lnRef>
+            <a:fillRef idx="1">
+              <a:schemeClr val="lt1"/>
+            </a:fillRef>
+            <a:effectRef idx="0">
+              <a:schemeClr val="dk1"/>
+            </a:effectRef>
+            <a:fontRef idx="minor">
+              <a:schemeClr val="dk1"/>
+            </a:fontRef>
+          </p:style>
+          <p:txBody>
+            <a:bodyPr rtlCol="0" anchor="ctr"/>
+            <a:lstStyle/>
+            <a:p>
+              <a:pPr algn="ctr"/>
+              <a:endParaRPr lang="de-DE"/>
+            </a:p>
+          </p:txBody>
+        </p:sp>
+        <p:sp>
+          <p:nvSpPr>
+            <p:cNvPr id="12" name="Abgerundetes Rechteck 11"/>
+            <p:cNvSpPr/>
+            <p:nvPr/>
+          </p:nvSpPr>
+          <p:spPr>
+            <a:xfrm rot="10800000">
+              <a:off x="6212125" y="2973610"/>
+              <a:ext cx="422038" cy="281573"/>
+            </a:xfrm>
+            <a:prstGeom prst="roundRect">
+              <a:avLst/>
+            </a:prstGeom>
+            <a:solidFill>
+              <a:srgbClr val="0070C0"/>
+            </a:solidFill>
+            <a:ln>
+              <a:solidFill>
+                <a:srgbClr val="0070C0"/>
+              </a:solidFill>
+            </a:ln>
+          </p:spPr>
+          <p:style>
+            <a:lnRef idx="1">
+              <a:schemeClr val="accent1"/>
+            </a:lnRef>
+            <a:fillRef idx="3">
+              <a:schemeClr val="accent1"/>
+            </a:fillRef>
+            <a:effectRef idx="2">
+              <a:schemeClr val="accent1"/>
+            </a:effectRef>
+            <a:fontRef idx="minor">
+              <a:schemeClr val="lt1"/>
+            </a:fontRef>
+          </p:style>
+          <p:txBody>
+            <a:bodyPr rtlCol="0" anchor="ctr"/>
+            <a:lstStyle/>
+            <a:p>
+              <a:pPr algn="ctr"/>
+              <a:endParaRPr lang="de-DE" dirty="0"/>
+            </a:p>
+          </p:txBody>
+        </p:sp>
+        <p:sp>
+          <p:nvSpPr>
+            <p:cNvPr id="13" name="Pfeil nach rechts 12"/>
+            <p:cNvSpPr/>
+            <p:nvPr/>
+          </p:nvSpPr>
+          <p:spPr>
+            <a:xfrm>
+              <a:off x="6300783" y="3090580"/>
+              <a:ext cx="219075" cy="45719"/>
+            </a:xfrm>
+            <a:prstGeom prst="rightArrow">
+              <a:avLst/>
+            </a:prstGeom>
+            <a:solidFill>
+              <a:schemeClr val="bg1"/>
+            </a:solidFill>
+            <a:ln>
+              <a:solidFill>
+                <a:schemeClr val="bg1"/>
+              </a:solidFill>
+            </a:ln>
+          </p:spPr>
+          <p:style>
+            <a:lnRef idx="2">
+              <a:schemeClr val="dk1"/>
+            </a:lnRef>
+            <a:fillRef idx="1">
+              <a:schemeClr val="lt1"/>
+            </a:fillRef>
+            <a:effectRef idx="0">
+              <a:schemeClr val="dk1"/>
+            </a:effectRef>
+            <a:fontRef idx="minor">
+              <a:schemeClr val="dk1"/>
+            </a:fontRef>
+          </p:style>
+          <p:txBody>
+            <a:bodyPr rtlCol="0" anchor="ctr"/>
+            <a:lstStyle/>
+            <a:p>
+              <a:pPr algn="ctr"/>
+              <a:endParaRPr lang="de-DE"/>
+            </a:p>
+          </p:txBody>
+        </p:sp>
+      </p:grpSp>
     </p:spTree>
     <p:extLst>
       <p:ext uri="{BB962C8B-B14F-4D97-AF65-F5344CB8AC3E}">
-        <p14:creationId xmlns:p14="http://schemas.microsoft.com/office/powerpoint/2010/main" val="1597402663"/>
+        <p14:creationId xmlns:p14="http://schemas.microsoft.com/office/powerpoint/2010/main" val="3993068824"/>
       </p:ext>
     </p:extLst>
   </p:cSld>
@@ -3826,6 +5200,776 @@
           </a:bodyPr>
           <a:lstStyle/>
           <a:p>
+            <a:endParaRPr lang="en-US" sz="2400" dirty="0"/>
+          </a:p>
+          <a:p>
+            <a:r>
+              <a:rPr lang="en-US" sz="2400" dirty="0"/>
+              <a:t>In addition to the visual task, there will be an auditory task as well. Therefore, </a:t>
+            </a:r>
+            <a:r>
+              <a:rPr lang="en-US" sz="2400" b="1" dirty="0"/>
+              <a:t>a tone</a:t>
+            </a:r>
+            <a:r>
+              <a:rPr lang="en-US" sz="2400" dirty="0"/>
+              <a:t> will occur during or shortly after the visual image.</a:t>
+            </a:r>
+          </a:p>
+          <a:p>
+            <a:endParaRPr lang="en-US" sz="2400" dirty="0"/>
+          </a:p>
+          <a:p>
+            <a:r>
+              <a:rPr lang="en-US" sz="2400" dirty="0"/>
+              <a:t>Your task will be to discriminate </a:t>
+            </a:r>
+            <a:r>
+              <a:rPr lang="en-US" sz="2400" b="1" dirty="0"/>
+              <a:t>“high” and “low” pitches </a:t>
+            </a:r>
+            <a:r>
+              <a:rPr lang="en-US" sz="2400" dirty="0"/>
+              <a:t>of the tone. Use </a:t>
+            </a:r>
+            <a:r>
+              <a:rPr lang="en-US" sz="2400" dirty="0" smtClean="0"/>
+              <a:t>the </a:t>
+            </a:r>
+            <a:r>
+              <a:rPr lang="en-US" sz="2400" b="1" dirty="0" smtClean="0"/>
+              <a:t>green</a:t>
+            </a:r>
+            <a:r>
+              <a:rPr lang="en-US" sz="2400" b="1" dirty="0" smtClean="0"/>
+              <a:t> button </a:t>
+            </a:r>
+            <a:r>
+              <a:rPr lang="en-US" sz="2400" dirty="0" smtClean="0"/>
+              <a:t>to </a:t>
+            </a:r>
+            <a:r>
+              <a:rPr lang="en-US" sz="2400" dirty="0"/>
+              <a:t>respond to </a:t>
+            </a:r>
+            <a:r>
+              <a:rPr lang="en-US" sz="2400" b="1" dirty="0" smtClean="0"/>
+              <a:t>high tone </a:t>
+            </a:r>
+            <a:r>
+              <a:rPr lang="en-US" sz="2400" dirty="0"/>
+              <a:t>and the </a:t>
+            </a:r>
+            <a:r>
+              <a:rPr lang="en-US" sz="2400" b="1" dirty="0" smtClean="0"/>
+              <a:t>blue button for </a:t>
+            </a:r>
+            <a:r>
+              <a:rPr lang="en-US" sz="2400" b="1" dirty="0" smtClean="0"/>
+              <a:t>low tones</a:t>
+            </a:r>
+            <a:r>
+              <a:rPr lang="en-US" sz="2400" dirty="0" smtClean="0"/>
+              <a:t>. </a:t>
+            </a:r>
+          </a:p>
+          <a:p>
+            <a:r>
+              <a:rPr lang="en-US" sz="2400" dirty="0" smtClean="0"/>
+              <a:t>Please </a:t>
+            </a:r>
+            <a:r>
+              <a:rPr lang="en-US" sz="2400" dirty="0"/>
+              <a:t>respond as quickly and as accurately as possible. Always respond </a:t>
+            </a:r>
+            <a:r>
+              <a:rPr lang="en-US" sz="2400" b="1" dirty="0"/>
+              <a:t>first to the visual</a:t>
+            </a:r>
+            <a:r>
+              <a:rPr lang="en-US" sz="2400" dirty="0"/>
+              <a:t> and then to the auditory task.</a:t>
+            </a:r>
+          </a:p>
+          <a:p>
+            <a:endParaRPr lang="en-US" sz="2400" dirty="0" smtClean="0"/>
+          </a:p>
+          <a:p>
+            <a:endParaRPr lang="en-US" sz="2400" dirty="0"/>
+          </a:p>
+          <a:p>
+            <a:r>
+              <a:rPr lang="en-US" sz="2400" dirty="0"/>
+              <a:t>  </a:t>
+            </a:r>
+          </a:p>
+          <a:p>
+            <a:endParaRPr lang="en-US" sz="2400" dirty="0"/>
+          </a:p>
+          <a:p>
+            <a:pPr algn="ctr"/>
+            <a:r>
+              <a:rPr lang="en-US" sz="2400" dirty="0"/>
+              <a:t>Press the </a:t>
+            </a:r>
+            <a:r>
+              <a:rPr lang="en-US" sz="2400" b="1" dirty="0"/>
+              <a:t>right arrow key </a:t>
+            </a:r>
+            <a:r>
+              <a:rPr lang="en-US" sz="2400" dirty="0"/>
+              <a:t>to </a:t>
+            </a:r>
+            <a:r>
+              <a:rPr lang="en-US" sz="2400" b="1" dirty="0"/>
+              <a:t>proceed</a:t>
+            </a:r>
+            <a:r>
+              <a:rPr lang="en-US" sz="2400" dirty="0"/>
+              <a:t> or the </a:t>
+            </a:r>
+            <a:r>
+              <a:rPr lang="en-US" sz="2400" b="1" dirty="0"/>
+              <a:t>left arrow key</a:t>
+            </a:r>
+            <a:r>
+              <a:rPr lang="en-US" sz="2400" dirty="0"/>
+              <a:t> to return to the </a:t>
+            </a:r>
+            <a:r>
+              <a:rPr lang="en-US" sz="2400" b="1" dirty="0"/>
+              <a:t>previous slide</a:t>
+            </a:r>
+          </a:p>
+          <a:p>
+            <a:endParaRPr lang="en-US" sz="2400" dirty="0"/>
+          </a:p>
+        </p:txBody>
+      </p:sp>
+      <p:grpSp>
+        <p:nvGrpSpPr>
+          <p:cNvPr id="3" name="Gruppieren 2"/>
+          <p:cNvGrpSpPr/>
+          <p:nvPr/>
+        </p:nvGrpSpPr>
+        <p:grpSpPr>
+          <a:xfrm>
+            <a:off x="5411310" y="4279935"/>
+            <a:ext cx="1395446" cy="1219279"/>
+            <a:chOff x="1866122" y="1498567"/>
+            <a:chExt cx="5075854" cy="3250713"/>
+          </a:xfrm>
+        </p:grpSpPr>
+        <p:pic>
+          <p:nvPicPr>
+            <p:cNvPr id="5" name="Grafik 4"/>
+            <p:cNvPicPr/>
+            <p:nvPr/>
+          </p:nvPicPr>
+          <p:blipFill rotWithShape="1">
+            <a:blip r:embed="rId2" cstate="hqprint">
+              <a:extLst>
+                <a:ext uri="{28A0092B-C50C-407E-A947-70E740481C1C}">
+                  <a14:useLocalDpi xmlns:a14="http://schemas.microsoft.com/office/drawing/2010/main" val="0"/>
+                </a:ext>
+              </a:extLst>
+            </a:blip>
+            <a:srcRect/>
+            <a:stretch/>
+          </p:blipFill>
+          <p:spPr bwMode="auto">
+            <a:xfrm>
+              <a:off x="1866122" y="1498567"/>
+              <a:ext cx="5075854" cy="3250713"/>
+            </a:xfrm>
+            <a:prstGeom prst="rect">
+              <a:avLst/>
+            </a:prstGeom>
+            <a:ln>
+              <a:noFill/>
+            </a:ln>
+            <a:extLst>
+              <a:ext uri="{53640926-AAD7-44D8-BBD7-CCE9431645EC}">
+                <a14:shadowObscured xmlns:a14="http://schemas.microsoft.com/office/drawing/2010/main"/>
+              </a:ext>
+            </a:extLst>
+          </p:spPr>
+        </p:pic>
+        <p:sp>
+          <p:nvSpPr>
+            <p:cNvPr id="6" name="Abgerundetes Rechteck 5"/>
+            <p:cNvSpPr/>
+            <p:nvPr/>
+          </p:nvSpPr>
+          <p:spPr>
+            <a:xfrm>
+              <a:off x="3290888" y="2271713"/>
+              <a:ext cx="623887" cy="442912"/>
+            </a:xfrm>
+            <a:prstGeom prst="roundRect">
+              <a:avLst/>
+            </a:prstGeom>
+            <a:solidFill>
+              <a:srgbClr val="00B050"/>
+            </a:solidFill>
+            <a:ln>
+              <a:solidFill>
+                <a:srgbClr val="00B050"/>
+              </a:solidFill>
+            </a:ln>
+          </p:spPr>
+          <p:style>
+            <a:lnRef idx="1">
+              <a:schemeClr val="accent1"/>
+            </a:lnRef>
+            <a:fillRef idx="3">
+              <a:schemeClr val="accent1"/>
+            </a:fillRef>
+            <a:effectRef idx="2">
+              <a:schemeClr val="accent1"/>
+            </a:effectRef>
+            <a:fontRef idx="minor">
+              <a:schemeClr val="lt1"/>
+            </a:fontRef>
+          </p:style>
+          <p:txBody>
+            <a:bodyPr rtlCol="0" anchor="ctr"/>
+            <a:lstStyle/>
+            <a:p>
+              <a:pPr algn="ctr"/>
+              <a:endParaRPr lang="de-DE"/>
+            </a:p>
+          </p:txBody>
+        </p:sp>
+        <p:sp>
+          <p:nvSpPr>
+            <p:cNvPr id="7" name="Abgerundetes Rechteck 6"/>
+            <p:cNvSpPr/>
+            <p:nvPr/>
+          </p:nvSpPr>
+          <p:spPr>
+            <a:xfrm>
+              <a:off x="4919663" y="2271713"/>
+              <a:ext cx="623887" cy="442912"/>
+            </a:xfrm>
+            <a:prstGeom prst="roundRect">
+              <a:avLst/>
+            </a:prstGeom>
+            <a:solidFill>
+              <a:srgbClr val="C00000"/>
+            </a:solidFill>
+            <a:ln>
+              <a:solidFill>
+                <a:srgbClr val="C00000"/>
+              </a:solidFill>
+            </a:ln>
+          </p:spPr>
+          <p:style>
+            <a:lnRef idx="1">
+              <a:schemeClr val="accent1"/>
+            </a:lnRef>
+            <a:fillRef idx="3">
+              <a:schemeClr val="accent1"/>
+            </a:fillRef>
+            <a:effectRef idx="2">
+              <a:schemeClr val="accent1"/>
+            </a:effectRef>
+            <a:fontRef idx="minor">
+              <a:schemeClr val="lt1"/>
+            </a:fontRef>
+          </p:style>
+          <p:txBody>
+            <a:bodyPr rtlCol="0" anchor="ctr"/>
+            <a:lstStyle/>
+            <a:p>
+              <a:pPr algn="ctr"/>
+              <a:endParaRPr lang="de-DE"/>
+            </a:p>
+          </p:txBody>
+        </p:sp>
+        <p:sp>
+          <p:nvSpPr>
+            <p:cNvPr id="8" name="Abgerundetes Rechteck 7"/>
+            <p:cNvSpPr/>
+            <p:nvPr/>
+          </p:nvSpPr>
+          <p:spPr>
+            <a:xfrm>
+              <a:off x="3290887" y="3676065"/>
+              <a:ext cx="623887" cy="442912"/>
+            </a:xfrm>
+            <a:prstGeom prst="roundRect">
+              <a:avLst/>
+            </a:prstGeom>
+            <a:solidFill>
+              <a:srgbClr val="0070C0"/>
+            </a:solidFill>
+            <a:ln>
+              <a:solidFill>
+                <a:srgbClr val="0070C0"/>
+              </a:solidFill>
+            </a:ln>
+          </p:spPr>
+          <p:style>
+            <a:lnRef idx="1">
+              <a:schemeClr val="accent1"/>
+            </a:lnRef>
+            <a:fillRef idx="3">
+              <a:schemeClr val="accent1"/>
+            </a:fillRef>
+            <a:effectRef idx="2">
+              <a:schemeClr val="accent1"/>
+            </a:effectRef>
+            <a:fontRef idx="minor">
+              <a:schemeClr val="lt1"/>
+            </a:fontRef>
+          </p:style>
+          <p:txBody>
+            <a:bodyPr rtlCol="0" anchor="ctr"/>
+            <a:lstStyle/>
+            <a:p>
+              <a:pPr algn="ctr"/>
+              <a:endParaRPr lang="de-DE"/>
+            </a:p>
+          </p:txBody>
+        </p:sp>
+        <p:sp>
+          <p:nvSpPr>
+            <p:cNvPr id="9" name="Abgerundetes Rechteck 8"/>
+            <p:cNvSpPr/>
+            <p:nvPr/>
+          </p:nvSpPr>
+          <p:spPr>
+            <a:xfrm>
+              <a:off x="4919663" y="3676065"/>
+              <a:ext cx="623887" cy="442912"/>
+            </a:xfrm>
+            <a:prstGeom prst="roundRect">
+              <a:avLst/>
+            </a:prstGeom>
+            <a:solidFill>
+              <a:srgbClr val="FFFF00"/>
+            </a:solidFill>
+            <a:ln>
+              <a:solidFill>
+                <a:srgbClr val="FFFF00"/>
+              </a:solidFill>
+            </a:ln>
+          </p:spPr>
+          <p:style>
+            <a:lnRef idx="1">
+              <a:schemeClr val="accent1"/>
+            </a:lnRef>
+            <a:fillRef idx="3">
+              <a:schemeClr val="accent1"/>
+            </a:fillRef>
+            <a:effectRef idx="2">
+              <a:schemeClr val="accent1"/>
+            </a:effectRef>
+            <a:fontRef idx="minor">
+              <a:schemeClr val="lt1"/>
+            </a:fontRef>
+          </p:style>
+          <p:txBody>
+            <a:bodyPr rtlCol="0" anchor="ctr"/>
+            <a:lstStyle/>
+            <a:p>
+              <a:pPr algn="ctr"/>
+              <a:endParaRPr lang="de-DE"/>
+            </a:p>
+          </p:txBody>
+        </p:sp>
+        <p:sp>
+          <p:nvSpPr>
+            <p:cNvPr id="10" name="Abgerundetes Rechteck 9"/>
+            <p:cNvSpPr/>
+            <p:nvPr/>
+          </p:nvSpPr>
+          <p:spPr>
+            <a:xfrm>
+              <a:off x="2225913" y="2973610"/>
+              <a:ext cx="422038" cy="281573"/>
+            </a:xfrm>
+            <a:prstGeom prst="roundRect">
+              <a:avLst/>
+            </a:prstGeom>
+            <a:solidFill>
+              <a:srgbClr val="0070C0"/>
+            </a:solidFill>
+            <a:ln>
+              <a:solidFill>
+                <a:srgbClr val="0070C0"/>
+              </a:solidFill>
+            </a:ln>
+          </p:spPr>
+          <p:style>
+            <a:lnRef idx="1">
+              <a:schemeClr val="accent1"/>
+            </a:lnRef>
+            <a:fillRef idx="3">
+              <a:schemeClr val="accent1"/>
+            </a:fillRef>
+            <a:effectRef idx="2">
+              <a:schemeClr val="accent1"/>
+            </a:effectRef>
+            <a:fontRef idx="minor">
+              <a:schemeClr val="lt1"/>
+            </a:fontRef>
+          </p:style>
+          <p:txBody>
+            <a:bodyPr rtlCol="0" anchor="ctr"/>
+            <a:lstStyle/>
+            <a:p>
+              <a:pPr algn="ctr"/>
+              <a:endParaRPr lang="de-DE" dirty="0"/>
+            </a:p>
+          </p:txBody>
+        </p:sp>
+        <p:sp>
+          <p:nvSpPr>
+            <p:cNvPr id="11" name="Pfeil nach rechts 10"/>
+            <p:cNvSpPr/>
+            <p:nvPr/>
+          </p:nvSpPr>
+          <p:spPr>
+            <a:xfrm rot="10800000">
+              <a:off x="2314571" y="3090580"/>
+              <a:ext cx="219075" cy="45719"/>
+            </a:xfrm>
+            <a:prstGeom prst="rightArrow">
+              <a:avLst/>
+            </a:prstGeom>
+            <a:solidFill>
+              <a:schemeClr val="bg1"/>
+            </a:solidFill>
+            <a:ln>
+              <a:solidFill>
+                <a:schemeClr val="bg1"/>
+              </a:solidFill>
+            </a:ln>
+          </p:spPr>
+          <p:style>
+            <a:lnRef idx="2">
+              <a:schemeClr val="dk1"/>
+            </a:lnRef>
+            <a:fillRef idx="1">
+              <a:schemeClr val="lt1"/>
+            </a:fillRef>
+            <a:effectRef idx="0">
+              <a:schemeClr val="dk1"/>
+            </a:effectRef>
+            <a:fontRef idx="minor">
+              <a:schemeClr val="dk1"/>
+            </a:fontRef>
+          </p:style>
+          <p:txBody>
+            <a:bodyPr rtlCol="0" anchor="ctr"/>
+            <a:lstStyle/>
+            <a:p>
+              <a:pPr algn="ctr"/>
+              <a:endParaRPr lang="de-DE"/>
+            </a:p>
+          </p:txBody>
+        </p:sp>
+        <p:sp>
+          <p:nvSpPr>
+            <p:cNvPr id="12" name="Abgerundetes Rechteck 11"/>
+            <p:cNvSpPr/>
+            <p:nvPr/>
+          </p:nvSpPr>
+          <p:spPr>
+            <a:xfrm rot="10800000">
+              <a:off x="6212125" y="2973610"/>
+              <a:ext cx="422038" cy="281573"/>
+            </a:xfrm>
+            <a:prstGeom prst="roundRect">
+              <a:avLst/>
+            </a:prstGeom>
+            <a:solidFill>
+              <a:srgbClr val="0070C0"/>
+            </a:solidFill>
+            <a:ln>
+              <a:solidFill>
+                <a:srgbClr val="0070C0"/>
+              </a:solidFill>
+            </a:ln>
+          </p:spPr>
+          <p:style>
+            <a:lnRef idx="1">
+              <a:schemeClr val="accent1"/>
+            </a:lnRef>
+            <a:fillRef idx="3">
+              <a:schemeClr val="accent1"/>
+            </a:fillRef>
+            <a:effectRef idx="2">
+              <a:schemeClr val="accent1"/>
+            </a:effectRef>
+            <a:fontRef idx="minor">
+              <a:schemeClr val="lt1"/>
+            </a:fontRef>
+          </p:style>
+          <p:txBody>
+            <a:bodyPr rtlCol="0" anchor="ctr"/>
+            <a:lstStyle/>
+            <a:p>
+              <a:pPr algn="ctr"/>
+              <a:endParaRPr lang="de-DE" dirty="0"/>
+            </a:p>
+          </p:txBody>
+        </p:sp>
+        <p:sp>
+          <p:nvSpPr>
+            <p:cNvPr id="13" name="Pfeil nach rechts 12"/>
+            <p:cNvSpPr/>
+            <p:nvPr/>
+          </p:nvSpPr>
+          <p:spPr>
+            <a:xfrm>
+              <a:off x="6300783" y="3090580"/>
+              <a:ext cx="219075" cy="45719"/>
+            </a:xfrm>
+            <a:prstGeom prst="rightArrow">
+              <a:avLst/>
+            </a:prstGeom>
+            <a:solidFill>
+              <a:schemeClr val="bg1"/>
+            </a:solidFill>
+            <a:ln>
+              <a:solidFill>
+                <a:schemeClr val="bg1"/>
+              </a:solidFill>
+            </a:ln>
+          </p:spPr>
+          <p:style>
+            <a:lnRef idx="2">
+              <a:schemeClr val="dk1"/>
+            </a:lnRef>
+            <a:fillRef idx="1">
+              <a:schemeClr val="lt1"/>
+            </a:fillRef>
+            <a:effectRef idx="0">
+              <a:schemeClr val="dk1"/>
+            </a:effectRef>
+            <a:fontRef idx="minor">
+              <a:schemeClr val="dk1"/>
+            </a:fontRef>
+          </p:style>
+          <p:txBody>
+            <a:bodyPr rtlCol="0" anchor="ctr"/>
+            <a:lstStyle/>
+            <a:p>
+              <a:pPr algn="ctr"/>
+              <a:endParaRPr lang="de-DE"/>
+            </a:p>
+          </p:txBody>
+        </p:sp>
+      </p:grpSp>
+    </p:spTree>
+    <p:extLst>
+      <p:ext uri="{BB962C8B-B14F-4D97-AF65-F5344CB8AC3E}">
+        <p14:creationId xmlns:p14="http://schemas.microsoft.com/office/powerpoint/2010/main" val="3832710868"/>
+      </p:ext>
+    </p:extLst>
+  </p:cSld>
+  <p:clrMapOvr>
+    <a:masterClrMapping/>
+  </p:clrMapOvr>
+</p:sld>
+</file>
+
+<file path=ppt/slides/slide6.xml><?xml version="1.0" encoding="utf-8"?>
+<p:sld xmlns:a="http://schemas.openxmlformats.org/drawingml/2006/main" xmlns:r="http://schemas.openxmlformats.org/officeDocument/2006/relationships" xmlns:p="http://schemas.openxmlformats.org/presentationml/2006/main">
+  <p:cSld>
+    <p:spTree>
+      <p:nvGrpSpPr>
+        <p:cNvPr id="1" name=""/>
+        <p:cNvGrpSpPr/>
+        <p:nvPr/>
+      </p:nvGrpSpPr>
+      <p:grpSpPr>
+        <a:xfrm>
+          <a:off x="0" y="0"/>
+          <a:ext cx="0" cy="0"/>
+          <a:chOff x="0" y="0"/>
+          <a:chExt cx="0" cy="0"/>
+        </a:xfrm>
+      </p:grpSpPr>
+      <p:sp>
+        <p:nvSpPr>
+          <p:cNvPr id="4" name="TextBox 3"/>
+          <p:cNvSpPr txBox="1"/>
+          <p:nvPr/>
+        </p:nvSpPr>
+        <p:spPr>
+          <a:xfrm>
+            <a:off x="2178287" y="294605"/>
+            <a:ext cx="7774486" cy="7109639"/>
+          </a:xfrm>
+          <a:prstGeom prst="rect">
+            <a:avLst/>
+          </a:prstGeom>
+          <a:noFill/>
+        </p:spPr>
+        <p:txBody>
+          <a:bodyPr wrap="square" rtlCol="0">
+            <a:spAutoFit/>
+          </a:bodyPr>
+          <a:lstStyle/>
+          <a:p>
+            <a:endParaRPr lang="en-US" sz="2400" dirty="0"/>
+          </a:p>
+          <a:p>
+            <a:r>
+              <a:rPr lang="en-US" sz="2400" dirty="0"/>
+              <a:t>Each sequence will last about </a:t>
+            </a:r>
+            <a:r>
+              <a:rPr lang="en-US" sz="2400" dirty="0" smtClean="0"/>
+              <a:t>2min. </a:t>
+            </a:r>
+            <a:r>
+              <a:rPr lang="en-US" sz="2400" dirty="0"/>
+              <a:t>You will be able to rest between sequences. The sequence will only begin after you press the </a:t>
+            </a:r>
+            <a:r>
+              <a:rPr lang="en-US" sz="2400" dirty="0" smtClean="0"/>
+              <a:t>right arrow key.</a:t>
+            </a:r>
+            <a:endParaRPr lang="en-US" sz="2400" dirty="0"/>
+          </a:p>
+          <a:p>
+            <a:endParaRPr lang="en-US" sz="2400" dirty="0"/>
+          </a:p>
+          <a:p>
+            <a:r>
+              <a:rPr lang="en-US" sz="2400" dirty="0"/>
+              <a:t>Please do your best to remain focused and alert, and keep your eyes fixed on the center of the screen. </a:t>
+            </a:r>
+          </a:p>
+          <a:p>
+            <a:endParaRPr lang="en-US" sz="2400" dirty="0"/>
+          </a:p>
+          <a:p>
+            <a:r>
+              <a:rPr lang="en-US" sz="2400" dirty="0"/>
+              <a:t>If you need a break, or have any questions, do not hesitate to ask the experimenter.</a:t>
+            </a:r>
+          </a:p>
+          <a:p>
+            <a:endParaRPr lang="en-US" sz="2400" dirty="0"/>
+          </a:p>
+          <a:p>
+            <a:r>
+              <a:rPr lang="en-US" sz="2400" dirty="0"/>
+              <a:t>We will start with a few practice trials, and you will have a chance to ask questions before starting the experiment.</a:t>
+            </a:r>
+          </a:p>
+          <a:p>
+            <a:r>
+              <a:rPr lang="en-US" sz="2400" b="1" dirty="0"/>
+              <a:t>Good luck!</a:t>
+            </a:r>
+            <a:endParaRPr lang="en-US" sz="2400" dirty="0"/>
+          </a:p>
+          <a:p>
+            <a:pPr algn="ctr"/>
+            <a:endParaRPr lang="en-US" sz="2400" dirty="0"/>
+          </a:p>
+          <a:p>
+            <a:pPr algn="ctr"/>
+            <a:r>
+              <a:rPr lang="en-US" sz="2400" dirty="0"/>
+              <a:t>Press the </a:t>
+            </a:r>
+            <a:r>
+              <a:rPr lang="en-US" sz="2400" b="1" dirty="0"/>
+              <a:t>right arrow key </a:t>
+            </a:r>
+            <a:r>
+              <a:rPr lang="en-US" sz="2400" dirty="0"/>
+              <a:t>to </a:t>
+            </a:r>
+            <a:r>
+              <a:rPr lang="en-US" sz="2400" b="1" dirty="0"/>
+              <a:t>proceed</a:t>
+            </a:r>
+            <a:r>
+              <a:rPr lang="en-US" sz="2400" dirty="0"/>
+              <a:t> or the </a:t>
+            </a:r>
+            <a:r>
+              <a:rPr lang="en-US" sz="2400" b="1" dirty="0"/>
+              <a:t>left arrow key</a:t>
+            </a:r>
+            <a:r>
+              <a:rPr lang="en-US" sz="2400" dirty="0"/>
+              <a:t> to return to the </a:t>
+            </a:r>
+            <a:r>
+              <a:rPr lang="en-US" sz="2400" b="1" dirty="0"/>
+              <a:t>previous slide</a:t>
+            </a:r>
+          </a:p>
+          <a:p>
+            <a:endParaRPr lang="en-US" sz="2400" dirty="0"/>
+          </a:p>
+          <a:p>
+            <a:endParaRPr lang="en-US" sz="2400" dirty="0"/>
+          </a:p>
+        </p:txBody>
+      </p:sp>
+    </p:spTree>
+    <p:extLst>
+      <p:ext uri="{BB962C8B-B14F-4D97-AF65-F5344CB8AC3E}">
+        <p14:creationId xmlns:p14="http://schemas.microsoft.com/office/powerpoint/2010/main" val="1597402663"/>
+      </p:ext>
+    </p:extLst>
+  </p:cSld>
+  <p:clrMapOvr>
+    <a:masterClrMapping/>
+  </p:clrMapOvr>
+</p:sld>
+</file>
+
+<file path=ppt/slides/slide7.xml><?xml version="1.0" encoding="utf-8"?>
+<p:sld xmlns:a="http://schemas.openxmlformats.org/drawingml/2006/main" xmlns:r="http://schemas.openxmlformats.org/officeDocument/2006/relationships" xmlns:p="http://schemas.openxmlformats.org/presentationml/2006/main">
+  <p:cSld>
+    <p:spTree>
+      <p:nvGrpSpPr>
+        <p:cNvPr id="1" name=""/>
+        <p:cNvGrpSpPr/>
+        <p:nvPr/>
+      </p:nvGrpSpPr>
+      <p:grpSpPr>
+        <a:xfrm>
+          <a:off x="0" y="0"/>
+          <a:ext cx="0" cy="0"/>
+          <a:chOff x="0" y="0"/>
+          <a:chExt cx="0" cy="0"/>
+        </a:xfrm>
+      </p:grpSpPr>
+      <p:sp>
+        <p:nvSpPr>
+          <p:cNvPr id="4" name="TextBox 3"/>
+          <p:cNvSpPr txBox="1"/>
+          <p:nvPr/>
+        </p:nvSpPr>
+        <p:spPr>
+          <a:xfrm>
+            <a:off x="2178287" y="315672"/>
+            <a:ext cx="7774486" cy="6740307"/>
+          </a:xfrm>
+          <a:prstGeom prst="rect">
+            <a:avLst/>
+          </a:prstGeom>
+          <a:noFill/>
+        </p:spPr>
+        <p:txBody>
+          <a:bodyPr wrap="square" rtlCol="0">
+            <a:spAutoFit/>
+          </a:bodyPr>
+          <a:lstStyle/>
+          <a:p>
             <a:endParaRPr lang="en-US" sz="2400" dirty="0" smtClean="0"/>
           </a:p>
           <a:p>
@@ -4015,7 +6159,7 @@
 </p:sld>
 </file>
 
-<file path=ppt/slides/slide6.xml><?xml version="1.0" encoding="utf-8"?>
+<file path=ppt/slides/slide8.xml><?xml version="1.0" encoding="utf-8"?>
 <p:sld xmlns:a="http://schemas.openxmlformats.org/drawingml/2006/main" xmlns:r="http://schemas.openxmlformats.org/officeDocument/2006/relationships" xmlns:p="http://schemas.openxmlformats.org/presentationml/2006/main">
   <p:cSld>
     <p:spTree>
@@ -4342,7 +6486,7 @@
 </p:sld>
 </file>
 
-<file path=ppt/slides/slide7.xml><?xml version="1.0" encoding="utf-8"?>
+<file path=ppt/slides/slide9.xml><?xml version="1.0" encoding="utf-8"?>
 <p:sld xmlns:a="http://schemas.openxmlformats.org/drawingml/2006/main" xmlns:r="http://schemas.openxmlformats.org/officeDocument/2006/relationships" xmlns:p="http://schemas.openxmlformats.org/presentationml/2006/main">
   <p:cSld>
     <p:spTree>
@@ -4390,11 +6534,7 @@
             </a:r>
             <a:r>
               <a:rPr lang="en-US" sz="2400" dirty="0" smtClean="0"/>
-              <a:t>4 </a:t>
-            </a:r>
-            <a:r>
-              <a:rPr lang="en-US" sz="2400" dirty="0" smtClean="0"/>
-              <a:t>min. </a:t>
+              <a:t>4 min. </a:t>
             </a:r>
             <a:r>
               <a:rPr lang="en-US" sz="2400" dirty="0"/>

</xml_diff>

<commit_message>
Add mouse repsonse for iRT
</commit_message>
<xml_diff>
--- a/instructions/Instructions.pptx
+++ b/instructions/Instructions.pptx
@@ -312,7 +312,7 @@
           <a:p>
             <a:fld id="{9D7C6ACB-8DF6-1449-BE97-CA8D947F79D3}" type="datetimeFigureOut">
               <a:rPr lang="en-US" smtClean="0"/>
-              <a:t>5/15/2023</a:t>
+              <a:t>5/16/2023</a:t>
             </a:fld>
             <a:endParaRPr lang="en-US"/>
           </a:p>
@@ -480,7 +480,7 @@
           <a:p>
             <a:fld id="{9D7C6ACB-8DF6-1449-BE97-CA8D947F79D3}" type="datetimeFigureOut">
               <a:rPr lang="en-US" smtClean="0"/>
-              <a:t>5/15/2023</a:t>
+              <a:t>5/16/2023</a:t>
             </a:fld>
             <a:endParaRPr lang="en-US"/>
           </a:p>
@@ -658,7 +658,7 @@
           <a:p>
             <a:fld id="{9D7C6ACB-8DF6-1449-BE97-CA8D947F79D3}" type="datetimeFigureOut">
               <a:rPr lang="en-US" smtClean="0"/>
-              <a:t>5/15/2023</a:t>
+              <a:t>5/16/2023</a:t>
             </a:fld>
             <a:endParaRPr lang="en-US"/>
           </a:p>
@@ -826,7 +826,7 @@
           <a:p>
             <a:fld id="{9D7C6ACB-8DF6-1449-BE97-CA8D947F79D3}" type="datetimeFigureOut">
               <a:rPr lang="en-US" smtClean="0"/>
-              <a:t>5/15/2023</a:t>
+              <a:t>5/16/2023</a:t>
             </a:fld>
             <a:endParaRPr lang="en-US"/>
           </a:p>
@@ -1071,7 +1071,7 @@
           <a:p>
             <a:fld id="{9D7C6ACB-8DF6-1449-BE97-CA8D947F79D3}" type="datetimeFigureOut">
               <a:rPr lang="en-US" smtClean="0"/>
-              <a:t>5/15/2023</a:t>
+              <a:t>5/16/2023</a:t>
             </a:fld>
             <a:endParaRPr lang="en-US"/>
           </a:p>
@@ -1356,7 +1356,7 @@
           <a:p>
             <a:fld id="{9D7C6ACB-8DF6-1449-BE97-CA8D947F79D3}" type="datetimeFigureOut">
               <a:rPr lang="en-US" smtClean="0"/>
-              <a:t>5/15/2023</a:t>
+              <a:t>5/16/2023</a:t>
             </a:fld>
             <a:endParaRPr lang="en-US"/>
           </a:p>
@@ -1775,7 +1775,7 @@
           <a:p>
             <a:fld id="{9D7C6ACB-8DF6-1449-BE97-CA8D947F79D3}" type="datetimeFigureOut">
               <a:rPr lang="en-US" smtClean="0"/>
-              <a:t>5/15/2023</a:t>
+              <a:t>5/16/2023</a:t>
             </a:fld>
             <a:endParaRPr lang="en-US"/>
           </a:p>
@@ -1892,7 +1892,7 @@
           <a:p>
             <a:fld id="{9D7C6ACB-8DF6-1449-BE97-CA8D947F79D3}" type="datetimeFigureOut">
               <a:rPr lang="en-US" smtClean="0"/>
-              <a:t>5/15/2023</a:t>
+              <a:t>5/16/2023</a:t>
             </a:fld>
             <a:endParaRPr lang="en-US"/>
           </a:p>
@@ -1987,7 +1987,7 @@
           <a:p>
             <a:fld id="{9D7C6ACB-8DF6-1449-BE97-CA8D947F79D3}" type="datetimeFigureOut">
               <a:rPr lang="en-US" smtClean="0"/>
-              <a:t>5/15/2023</a:t>
+              <a:t>5/16/2023</a:t>
             </a:fld>
             <a:endParaRPr lang="en-US"/>
           </a:p>
@@ -2262,7 +2262,7 @@
           <a:p>
             <a:fld id="{9D7C6ACB-8DF6-1449-BE97-CA8D947F79D3}" type="datetimeFigureOut">
               <a:rPr lang="en-US" smtClean="0"/>
-              <a:t>5/15/2023</a:t>
+              <a:t>5/16/2023</a:t>
             </a:fld>
             <a:endParaRPr lang="en-US"/>
           </a:p>
@@ -2514,7 +2514,7 @@
           <a:p>
             <a:fld id="{9D7C6ACB-8DF6-1449-BE97-CA8D947F79D3}" type="datetimeFigureOut">
               <a:rPr lang="en-US" smtClean="0"/>
-              <a:t>5/15/2023</a:t>
+              <a:t>5/16/2023</a:t>
             </a:fld>
             <a:endParaRPr lang="en-US"/>
           </a:p>
@@ -2728,7 +2728,7 @@
           <a:p>
             <a:fld id="{9D7C6ACB-8DF6-1449-BE97-CA8D947F79D3}" type="datetimeFigureOut">
               <a:rPr lang="en-US" smtClean="0"/>
-              <a:t>5/15/2023</a:t>
+              <a:t>5/16/2023</a:t>
             </a:fld>
             <a:endParaRPr lang="en-US"/>
           </a:p>
@@ -3412,11 +3412,7 @@
             <a:pPr algn="ctr"/>
             <a:r>
               <a:rPr lang="en-US" sz="2400" dirty="0" smtClean="0"/>
-              <a:t>Press </a:t>
-            </a:r>
-            <a:r>
-              <a:rPr lang="en-US" sz="2400" dirty="0" smtClean="0"/>
-              <a:t>the </a:t>
+              <a:t>Press the </a:t>
             </a:r>
             <a:r>
               <a:rPr lang="en-US" sz="2400" b="1" dirty="0" smtClean="0"/>
@@ -3540,13 +3536,13 @@
         </p:nvPicPr>
         <p:blipFill rotWithShape="1">
           <a:blip r:embed="rId2"/>
-          <a:srcRect t="-1" b="63014"/>
+          <a:srcRect t="-1" b="79302"/>
           <a:stretch/>
         </p:blipFill>
         <p:spPr bwMode="auto">
           <a:xfrm>
             <a:off x="3844212" y="1286785"/>
-            <a:ext cx="4310132" cy="1094189"/>
+            <a:ext cx="4310132" cy="612353"/>
           </a:xfrm>
           <a:prstGeom prst="rect">
             <a:avLst/>
@@ -3568,7 +3564,7 @@
         </p:blipFill>
         <p:spPr bwMode="auto">
           <a:xfrm>
-            <a:off x="3844212" y="2333613"/>
+            <a:off x="3844212" y="2161674"/>
             <a:ext cx="4310132" cy="975013"/>
           </a:xfrm>
           <a:prstGeom prst="rect">
@@ -3753,19 +3749,11 @@
           <a:p>
             <a:r>
               <a:rPr lang="en-US" sz="2400" dirty="0"/>
-              <a:t>Each sequence will last about </a:t>
-            </a:r>
-            <a:r>
-              <a:rPr lang="en-US" sz="2400" dirty="0"/>
-              <a:t>3</a:t>
+              <a:t>Each sequence will last about 3</a:t>
             </a:r>
             <a:r>
               <a:rPr lang="en-US" sz="2400" dirty="0" smtClean="0"/>
-              <a:t> </a:t>
-            </a:r>
-            <a:r>
-              <a:rPr lang="en-US" sz="2400" dirty="0" smtClean="0"/>
-              <a:t>min. </a:t>
+              <a:t> min. </a:t>
             </a:r>
             <a:r>
               <a:rPr lang="en-US" sz="2400" dirty="0"/>
@@ -5204,11 +5192,7 @@
             </a:r>
             <a:r>
               <a:rPr lang="en-US" sz="2400" b="1" dirty="0" smtClean="0"/>
-              <a:t>little orange </a:t>
-            </a:r>
-            <a:r>
-              <a:rPr lang="en-US" sz="2400" b="1" dirty="0" smtClean="0"/>
-              <a:t>button </a:t>
+              <a:t>little orange button </a:t>
             </a:r>
             <a:r>
               <a:rPr lang="en-US" sz="2400" dirty="0"/>

</xml_diff>